<commit_message>
Student Info Frame Updated
</commit_message>
<xml_diff>
--- a/05-29.pptx
+++ b/05-29.pptx
@@ -5,14 +5,16 @@
     <p:sldMasterId id="2147483996" r:id="rId1"/>
   </p:sldMasterIdLst>
   <p:notesMasterIdLst>
-    <p:notesMasterId r:id="rId7"/>
+    <p:notesMasterId r:id="rId9"/>
   </p:notesMasterIdLst>
   <p:sldIdLst>
     <p:sldId id="256" r:id="rId2"/>
     <p:sldId id="259" r:id="rId3"/>
     <p:sldId id="260" r:id="rId4"/>
     <p:sldId id="261" r:id="rId5"/>
-    <p:sldId id="262" r:id="rId6"/>
+    <p:sldId id="263" r:id="rId6"/>
+    <p:sldId id="264" r:id="rId7"/>
+    <p:sldId id="262" r:id="rId8"/>
   </p:sldIdLst>
   <p:sldSz cx="9144000" cy="6858000" type="screen4x3"/>
   <p:notesSz cx="6858000" cy="9144000"/>
@@ -197,7 +199,7 @@
             <a:fld id="{E8AB01BB-166A-41F2-BD17-9B3A98F3365D}" type="datetimeFigureOut">
               <a:rPr lang="en-US" smtClean="0"/>
               <a:pPr/>
-              <a:t>5/31/2016</a:t>
+              <a:t>9/26/2016</a:t>
             </a:fld>
             <a:endParaRPr lang="en-US"/>
           </a:p>
@@ -657,7 +659,7 @@
             <a:fld id="{1D8BD707-D9CF-40AE-B4C6-C98DA3205C09}" type="datetimeFigureOut">
               <a:rPr lang="en-US" smtClean="0"/>
               <a:pPr/>
-              <a:t>5/31/2016</a:t>
+              <a:t>9/26/2016</a:t>
             </a:fld>
             <a:endParaRPr lang="en-US"/>
           </a:p>
@@ -885,7 +887,7 @@
             <a:fld id="{1D8BD707-D9CF-40AE-B4C6-C98DA3205C09}" type="datetimeFigureOut">
               <a:rPr lang="en-US" smtClean="0"/>
               <a:pPr/>
-              <a:t>5/31/2016</a:t>
+              <a:t>9/26/2016</a:t>
             </a:fld>
             <a:endParaRPr lang="en-US"/>
           </a:p>
@@ -1062,7 +1064,7 @@
             <a:fld id="{1D8BD707-D9CF-40AE-B4C6-C98DA3205C09}" type="datetimeFigureOut">
               <a:rPr lang="en-US" smtClean="0"/>
               <a:pPr/>
-              <a:t>5/31/2016</a:t>
+              <a:t>9/26/2016</a:t>
             </a:fld>
             <a:endParaRPr lang="en-US"/>
           </a:p>
@@ -1229,7 +1231,7 @@
             <a:fld id="{1D8BD707-D9CF-40AE-B4C6-C98DA3205C09}" type="datetimeFigureOut">
               <a:rPr lang="en-US" smtClean="0"/>
               <a:pPr/>
-              <a:t>5/31/2016</a:t>
+              <a:t>9/26/2016</a:t>
             </a:fld>
             <a:endParaRPr lang="en-US"/>
           </a:p>
@@ -1475,7 +1477,7 @@
             <a:fld id="{1D8BD707-D9CF-40AE-B4C6-C98DA3205C09}" type="datetimeFigureOut">
               <a:rPr lang="en-US" smtClean="0"/>
               <a:pPr/>
-              <a:t>5/31/2016</a:t>
+              <a:t>9/26/2016</a:t>
             </a:fld>
             <a:endParaRPr lang="en-US"/>
           </a:p>
@@ -1741,7 +1743,7 @@
             <a:fld id="{1D8BD707-D9CF-40AE-B4C6-C98DA3205C09}" type="datetimeFigureOut">
               <a:rPr lang="en-US" smtClean="0"/>
               <a:pPr/>
-              <a:t>5/31/2016</a:t>
+              <a:t>9/26/2016</a:t>
             </a:fld>
             <a:endParaRPr lang="en-US"/>
           </a:p>
@@ -2117,7 +2119,7 @@
             <a:fld id="{1D8BD707-D9CF-40AE-B4C6-C98DA3205C09}" type="datetimeFigureOut">
               <a:rPr lang="en-US" smtClean="0"/>
               <a:pPr/>
-              <a:t>5/31/2016</a:t>
+              <a:t>9/26/2016</a:t>
             </a:fld>
             <a:endParaRPr lang="en-US"/>
           </a:p>
@@ -2232,7 +2234,7 @@
             <a:fld id="{1D8BD707-D9CF-40AE-B4C6-C98DA3205C09}" type="datetimeFigureOut">
               <a:rPr lang="en-US" smtClean="0"/>
               <a:pPr/>
-              <a:t>5/31/2016</a:t>
+              <a:t>9/26/2016</a:t>
             </a:fld>
             <a:endParaRPr lang="en-US"/>
           </a:p>
@@ -2324,7 +2326,7 @@
             <a:fld id="{1D8BD707-D9CF-40AE-B4C6-C98DA3205C09}" type="datetimeFigureOut">
               <a:rPr lang="en-US" smtClean="0"/>
               <a:pPr/>
-              <a:t>5/31/2016</a:t>
+              <a:t>9/26/2016</a:t>
             </a:fld>
             <a:endParaRPr lang="en-US"/>
           </a:p>
@@ -2584,7 +2586,7 @@
             <a:fld id="{1D8BD707-D9CF-40AE-B4C6-C98DA3205C09}" type="datetimeFigureOut">
               <a:rPr lang="en-US" smtClean="0"/>
               <a:pPr/>
-              <a:t>5/31/2016</a:t>
+              <a:t>9/26/2016</a:t>
             </a:fld>
             <a:endParaRPr lang="en-US"/>
           </a:p>
@@ -2850,7 +2852,7 @@
             <a:fld id="{1D8BD707-D9CF-40AE-B4C6-C98DA3205C09}" type="datetimeFigureOut">
               <a:rPr lang="en-US" smtClean="0"/>
               <a:pPr/>
-              <a:t>5/31/2016</a:t>
+              <a:t>9/26/2016</a:t>
             </a:fld>
             <a:endParaRPr lang="en-US"/>
           </a:p>
@@ -3069,7 +3071,7 @@
             <a:fld id="{1D8BD707-D9CF-40AE-B4C6-C98DA3205C09}" type="datetimeFigureOut">
               <a:rPr lang="en-US" smtClean="0"/>
               <a:pPr/>
-              <a:t>5/31/2016</a:t>
+              <a:t>9/26/2016</a:t>
             </a:fld>
             <a:endParaRPr lang="en-US"/>
           </a:p>
@@ -3945,8 +3947,23 @@
                 </a:solidFill>
                 <a:latin typeface="Franklin Gothic Medium" pitchFamily="34" charset="0"/>
               </a:rPr>
-              <a:t>Asst. Professor &amp; Head</a:t>
-            </a:r>
+              <a:t>Asst. </a:t>
+            </a:r>
+            <a:r>
+              <a:rPr lang="en-US" smtClean="0">
+                <a:solidFill>
+                  <a:schemeClr val="bg1"/>
+                </a:solidFill>
+                <a:latin typeface="Franklin Gothic Medium" pitchFamily="34" charset="0"/>
+              </a:rPr>
+              <a:t>Professor </a:t>
+            </a:r>
+            <a:endParaRPr lang="en-US" dirty="0" smtClean="0">
+              <a:solidFill>
+                <a:schemeClr val="bg1"/>
+              </a:solidFill>
+              <a:latin typeface="Franklin Gothic Medium" pitchFamily="34" charset="0"/>
+            </a:endParaRPr>
           </a:p>
           <a:p>
             <a:pPr algn="ctr">
@@ -4431,16 +4448,7 @@
                 </a:solidFill>
                 <a:latin typeface="Franklin Gothic Medium" pitchFamily="34" charset="0"/>
               </a:rPr>
-              <a:t>The Objective is to create a </a:t>
-            </a:r>
-            <a:r>
-              <a:rPr lang="en-US" dirty="0" smtClean="0">
-                <a:solidFill>
-                  <a:schemeClr val="bg1"/>
-                </a:solidFill>
-                <a:latin typeface="Franklin Gothic Medium" pitchFamily="34" charset="0"/>
-              </a:rPr>
-              <a:t>desktop </a:t>
+              <a:t>The Objective is to create a desktop </a:t>
             </a:r>
             <a:r>
               <a:rPr lang="en-US" smtClean="0">
@@ -6053,6 +6061,2715 @@
         <p:spPr>
           <a:xfrm>
             <a:off x="457200" y="274638"/>
+            <a:ext cx="8229600" cy="792162"/>
+          </a:xfrm>
+        </p:spPr>
+        <p:txBody>
+          <a:bodyPr>
+            <a:normAutofit fontScale="90000"/>
+          </a:bodyPr>
+          <a:lstStyle/>
+          <a:p>
+            <a:r>
+              <a:rPr lang="en-US" sz="5000" dirty="0" smtClean="0">
+                <a:solidFill>
+                  <a:srgbClr val="080808"/>
+                </a:solidFill>
+                <a:latin typeface="Bookman Old Style" pitchFamily="18" charset="0"/>
+              </a:rPr>
+              <a:t>Database Table</a:t>
+            </a:r>
+            <a:endParaRPr lang="en-US" sz="5000" dirty="0">
+              <a:solidFill>
+                <a:srgbClr val="080808"/>
+              </a:solidFill>
+              <a:latin typeface="Bookman Old Style" pitchFamily="18" charset="0"/>
+            </a:endParaRPr>
+          </a:p>
+        </p:txBody>
+      </p:sp>
+      <p:sp>
+        <p:nvSpPr>
+          <p:cNvPr id="7" name="Content Placeholder 6"/>
+          <p:cNvSpPr>
+            <a:spLocks noGrp="1"/>
+          </p:cNvSpPr>
+          <p:nvPr>
+            <p:ph idx="1"/>
+          </p:nvPr>
+        </p:nvSpPr>
+        <p:spPr>
+          <a:xfrm>
+            <a:off x="457200" y="762000"/>
+            <a:ext cx="8229600" cy="5547360"/>
+          </a:xfrm>
+        </p:spPr>
+        <p:txBody>
+          <a:bodyPr>
+            <a:normAutofit/>
+          </a:bodyPr>
+          <a:lstStyle/>
+          <a:p>
+            <a:pPr>
+              <a:buNone/>
+            </a:pPr>
+            <a:r>
+              <a:rPr lang="en-US" dirty="0" smtClean="0">
+                <a:solidFill>
+                  <a:schemeClr val="bg1"/>
+                </a:solidFill>
+                <a:latin typeface="Franklin Gothic Medium" pitchFamily="34" charset="0"/>
+              </a:rPr>
+              <a:t>Course Info</a:t>
+            </a:r>
+          </a:p>
+          <a:p>
+            <a:pPr>
+              <a:buNone/>
+            </a:pPr>
+            <a:endParaRPr lang="en-US" dirty="0" smtClean="0">
+              <a:solidFill>
+                <a:schemeClr val="bg1"/>
+              </a:solidFill>
+              <a:latin typeface="Franklin Gothic Medium" pitchFamily="34" charset="0"/>
+            </a:endParaRPr>
+          </a:p>
+          <a:p>
+            <a:pPr>
+              <a:buNone/>
+            </a:pPr>
+            <a:endParaRPr lang="en-US" dirty="0" smtClean="0">
+              <a:solidFill>
+                <a:schemeClr val="bg1"/>
+              </a:solidFill>
+              <a:latin typeface="Franklin Gothic Medium" pitchFamily="34" charset="0"/>
+            </a:endParaRPr>
+          </a:p>
+          <a:p>
+            <a:pPr>
+              <a:buNone/>
+            </a:pPr>
+            <a:r>
+              <a:rPr lang="en-US" dirty="0" smtClean="0">
+                <a:solidFill>
+                  <a:schemeClr val="bg1"/>
+                </a:solidFill>
+                <a:latin typeface="Franklin Gothic Medium" pitchFamily="34" charset="0"/>
+              </a:rPr>
+              <a:t>Student Info</a:t>
+            </a:r>
+          </a:p>
+          <a:p>
+            <a:pPr>
+              <a:buNone/>
+            </a:pPr>
+            <a:endParaRPr lang="en-US" dirty="0" smtClean="0">
+              <a:solidFill>
+                <a:schemeClr val="bg1"/>
+              </a:solidFill>
+              <a:latin typeface="Franklin Gothic Medium" pitchFamily="34" charset="0"/>
+            </a:endParaRPr>
+          </a:p>
+          <a:p>
+            <a:pPr>
+              <a:buNone/>
+            </a:pPr>
+            <a:r>
+              <a:rPr lang="en-US" dirty="0" smtClean="0">
+                <a:solidFill>
+                  <a:schemeClr val="bg1"/>
+                </a:solidFill>
+                <a:latin typeface="Franklin Gothic Medium" pitchFamily="34" charset="0"/>
+              </a:rPr>
+              <a:t>Room Info</a:t>
+            </a:r>
+          </a:p>
+          <a:p>
+            <a:pPr>
+              <a:buNone/>
+            </a:pPr>
+            <a:endParaRPr lang="en-US" dirty="0" smtClean="0">
+              <a:solidFill>
+                <a:schemeClr val="bg1"/>
+              </a:solidFill>
+              <a:latin typeface="Franklin Gothic Medium" pitchFamily="34" charset="0"/>
+            </a:endParaRPr>
+          </a:p>
+          <a:p>
+            <a:pPr>
+              <a:buNone/>
+            </a:pPr>
+            <a:endParaRPr lang="en-US" dirty="0" smtClean="0">
+              <a:solidFill>
+                <a:schemeClr val="bg1"/>
+              </a:solidFill>
+              <a:latin typeface="Franklin Gothic Medium" pitchFamily="34" charset="0"/>
+            </a:endParaRPr>
+          </a:p>
+          <a:p>
+            <a:pPr>
+              <a:buNone/>
+            </a:pPr>
+            <a:r>
+              <a:rPr lang="en-US" dirty="0" smtClean="0">
+                <a:solidFill>
+                  <a:schemeClr val="bg1"/>
+                </a:solidFill>
+                <a:latin typeface="Franklin Gothic Medium" pitchFamily="34" charset="0"/>
+              </a:rPr>
+              <a:t>Routine</a:t>
+            </a:r>
+          </a:p>
+          <a:p>
+            <a:pPr>
+              <a:buNone/>
+            </a:pPr>
+            <a:endParaRPr lang="en-US" dirty="0" smtClean="0">
+              <a:solidFill>
+                <a:schemeClr val="bg1"/>
+              </a:solidFill>
+              <a:latin typeface="Franklin Gothic Medium" pitchFamily="34" charset="0"/>
+            </a:endParaRPr>
+          </a:p>
+        </p:txBody>
+      </p:sp>
+      <p:graphicFrame>
+        <p:nvGraphicFramePr>
+          <p:cNvPr id="8" name="Table 7"/>
+          <p:cNvGraphicFramePr>
+            <a:graphicFrameLocks noGrp="1"/>
+          </p:cNvGraphicFramePr>
+          <p:nvPr/>
+        </p:nvGraphicFramePr>
+        <p:xfrm>
+          <a:off x="762000" y="1295400"/>
+          <a:ext cx="7391400" cy="1010920"/>
+        </p:xfrm>
+        <a:graphic>
+          <a:graphicData uri="http://schemas.openxmlformats.org/drawingml/2006/table">
+            <a:tbl>
+              <a:tblPr firstRow="1" bandRow="1">
+                <a:tableStyleId>{5C22544A-7EE6-4342-B048-85BDC9FD1C3A}</a:tableStyleId>
+              </a:tblPr>
+              <a:tblGrid>
+                <a:gridCol w="1478280"/>
+                <a:gridCol w="1478280"/>
+                <a:gridCol w="1478280"/>
+                <a:gridCol w="1478280"/>
+                <a:gridCol w="1478280"/>
+              </a:tblGrid>
+              <a:tr h="370840">
+                <a:tc>
+                  <a:txBody>
+                    <a:bodyPr/>
+                    <a:lstStyle/>
+                    <a:p>
+                      <a:pPr algn="ctr"/>
+                      <a:r>
+                        <a:rPr lang="en-US" dirty="0" err="1" smtClean="0">
+                          <a:solidFill>
+                            <a:srgbClr val="080808"/>
+                          </a:solidFill>
+                        </a:rPr>
+                        <a:t>Couse</a:t>
+                      </a:r>
+                      <a:r>
+                        <a:rPr lang="en-US" dirty="0" smtClean="0">
+                          <a:solidFill>
+                            <a:srgbClr val="080808"/>
+                          </a:solidFill>
+                        </a:rPr>
+                        <a:t> ID</a:t>
+                      </a:r>
+                      <a:endParaRPr lang="en-US" dirty="0">
+                        <a:solidFill>
+                          <a:srgbClr val="080808"/>
+                        </a:solidFill>
+                      </a:endParaRPr>
+                    </a:p>
+                  </a:txBody>
+                  <a:tcPr/>
+                </a:tc>
+                <a:tc>
+                  <a:txBody>
+                    <a:bodyPr/>
+                    <a:lstStyle/>
+                    <a:p>
+                      <a:pPr algn="ctr"/>
+                      <a:r>
+                        <a:rPr lang="en-US" dirty="0" smtClean="0">
+                          <a:solidFill>
+                            <a:srgbClr val="080808"/>
+                          </a:solidFill>
+                        </a:rPr>
+                        <a:t>Teacher</a:t>
+                      </a:r>
+                      <a:r>
+                        <a:rPr lang="en-US" baseline="0" dirty="0" smtClean="0">
+                          <a:solidFill>
+                            <a:srgbClr val="080808"/>
+                          </a:solidFill>
+                        </a:rPr>
+                        <a:t> ID</a:t>
+                      </a:r>
+                      <a:endParaRPr lang="en-US" dirty="0">
+                        <a:solidFill>
+                          <a:srgbClr val="080808"/>
+                        </a:solidFill>
+                      </a:endParaRPr>
+                    </a:p>
+                  </a:txBody>
+                  <a:tcPr/>
+                </a:tc>
+                <a:tc>
+                  <a:txBody>
+                    <a:bodyPr/>
+                    <a:lstStyle/>
+                    <a:p>
+                      <a:pPr algn="ctr"/>
+                      <a:r>
+                        <a:rPr lang="en-US" dirty="0" smtClean="0">
+                          <a:solidFill>
+                            <a:srgbClr val="080808"/>
+                          </a:solidFill>
+                        </a:rPr>
+                        <a:t>Slot Per Week</a:t>
+                      </a:r>
+                      <a:endParaRPr lang="en-US" dirty="0">
+                        <a:solidFill>
+                          <a:srgbClr val="080808"/>
+                        </a:solidFill>
+                      </a:endParaRPr>
+                    </a:p>
+                  </a:txBody>
+                  <a:tcPr/>
+                </a:tc>
+                <a:tc>
+                  <a:txBody>
+                    <a:bodyPr/>
+                    <a:lstStyle/>
+                    <a:p>
+                      <a:pPr algn="ctr"/>
+                      <a:r>
+                        <a:rPr lang="en-US" dirty="0" smtClean="0">
+                          <a:solidFill>
+                            <a:srgbClr val="080808"/>
+                          </a:solidFill>
+                        </a:rPr>
+                        <a:t>Batch</a:t>
+                      </a:r>
+                      <a:endParaRPr lang="en-US" dirty="0">
+                        <a:solidFill>
+                          <a:srgbClr val="080808"/>
+                        </a:solidFill>
+                      </a:endParaRPr>
+                    </a:p>
+                  </a:txBody>
+                  <a:tcPr/>
+                </a:tc>
+                <a:tc>
+                  <a:txBody>
+                    <a:bodyPr/>
+                    <a:lstStyle/>
+                    <a:p>
+                      <a:pPr algn="ctr"/>
+                      <a:r>
+                        <a:rPr lang="en-US" dirty="0" smtClean="0">
+                          <a:solidFill>
+                            <a:srgbClr val="080808"/>
+                          </a:solidFill>
+                        </a:rPr>
+                        <a:t>Type</a:t>
+                      </a:r>
+                      <a:endParaRPr lang="en-US" dirty="0">
+                        <a:solidFill>
+                          <a:srgbClr val="080808"/>
+                        </a:solidFill>
+                      </a:endParaRPr>
+                    </a:p>
+                  </a:txBody>
+                  <a:tcPr/>
+                </a:tc>
+              </a:tr>
+              <a:tr h="370840">
+                <a:tc>
+                  <a:txBody>
+                    <a:bodyPr/>
+                    <a:lstStyle/>
+                    <a:p>
+                      <a:pPr algn="ctr"/>
+                      <a:endParaRPr lang="en-US" dirty="0">
+                        <a:solidFill>
+                          <a:srgbClr val="080808"/>
+                        </a:solidFill>
+                      </a:endParaRPr>
+                    </a:p>
+                  </a:txBody>
+                  <a:tcPr/>
+                </a:tc>
+                <a:tc>
+                  <a:txBody>
+                    <a:bodyPr/>
+                    <a:lstStyle/>
+                    <a:p>
+                      <a:pPr algn="ctr"/>
+                      <a:endParaRPr lang="en-US" dirty="0">
+                        <a:solidFill>
+                          <a:srgbClr val="080808"/>
+                        </a:solidFill>
+                      </a:endParaRPr>
+                    </a:p>
+                  </a:txBody>
+                  <a:tcPr/>
+                </a:tc>
+                <a:tc>
+                  <a:txBody>
+                    <a:bodyPr/>
+                    <a:lstStyle/>
+                    <a:p>
+                      <a:pPr algn="ctr"/>
+                      <a:endParaRPr lang="en-US">
+                        <a:solidFill>
+                          <a:srgbClr val="080808"/>
+                        </a:solidFill>
+                      </a:endParaRPr>
+                    </a:p>
+                  </a:txBody>
+                  <a:tcPr/>
+                </a:tc>
+                <a:tc>
+                  <a:txBody>
+                    <a:bodyPr/>
+                    <a:lstStyle/>
+                    <a:p>
+                      <a:pPr algn="ctr"/>
+                      <a:endParaRPr lang="en-US">
+                        <a:solidFill>
+                          <a:srgbClr val="080808"/>
+                        </a:solidFill>
+                      </a:endParaRPr>
+                    </a:p>
+                  </a:txBody>
+                  <a:tcPr/>
+                </a:tc>
+                <a:tc>
+                  <a:txBody>
+                    <a:bodyPr/>
+                    <a:lstStyle/>
+                    <a:p>
+                      <a:pPr algn="ctr"/>
+                      <a:endParaRPr lang="en-US" dirty="0">
+                        <a:solidFill>
+                          <a:srgbClr val="080808"/>
+                        </a:solidFill>
+                      </a:endParaRPr>
+                    </a:p>
+                  </a:txBody>
+                  <a:tcPr/>
+                </a:tc>
+              </a:tr>
+            </a:tbl>
+          </a:graphicData>
+        </a:graphic>
+      </p:graphicFrame>
+      <p:graphicFrame>
+        <p:nvGraphicFramePr>
+          <p:cNvPr id="9" name="Table 8"/>
+          <p:cNvGraphicFramePr>
+            <a:graphicFrameLocks noGrp="1"/>
+          </p:cNvGraphicFramePr>
+          <p:nvPr/>
+        </p:nvGraphicFramePr>
+        <p:xfrm>
+          <a:off x="762000" y="2743200"/>
+          <a:ext cx="6248400" cy="731520"/>
+        </p:xfrm>
+        <a:graphic>
+          <a:graphicData uri="http://schemas.openxmlformats.org/drawingml/2006/table">
+            <a:tbl>
+              <a:tblPr firstRow="1" bandRow="1">
+                <a:tableStyleId>{5C22544A-7EE6-4342-B048-85BDC9FD1C3A}</a:tableStyleId>
+              </a:tblPr>
+              <a:tblGrid>
+                <a:gridCol w="3124200"/>
+                <a:gridCol w="3124200"/>
+              </a:tblGrid>
+              <a:tr h="0">
+                <a:tc>
+                  <a:txBody>
+                    <a:bodyPr/>
+                    <a:lstStyle/>
+                    <a:p>
+                      <a:pPr algn="ctr"/>
+                      <a:r>
+                        <a:rPr lang="en-US" dirty="0" smtClean="0">
+                          <a:solidFill>
+                            <a:srgbClr val="080808"/>
+                          </a:solidFill>
+                        </a:rPr>
+                        <a:t>Course</a:t>
+                      </a:r>
+                      <a:r>
+                        <a:rPr lang="en-US" baseline="0" dirty="0" smtClean="0">
+                          <a:solidFill>
+                            <a:srgbClr val="080808"/>
+                          </a:solidFill>
+                        </a:rPr>
+                        <a:t> ID</a:t>
+                      </a:r>
+                      <a:endParaRPr lang="en-US" dirty="0">
+                        <a:solidFill>
+                          <a:srgbClr val="080808"/>
+                        </a:solidFill>
+                      </a:endParaRPr>
+                    </a:p>
+                  </a:txBody>
+                  <a:tcPr/>
+                </a:tc>
+                <a:tc>
+                  <a:txBody>
+                    <a:bodyPr/>
+                    <a:lstStyle/>
+                    <a:p>
+                      <a:pPr algn="ctr"/>
+                      <a:r>
+                        <a:rPr lang="en-US" dirty="0" smtClean="0">
+                          <a:solidFill>
+                            <a:srgbClr val="080808"/>
+                          </a:solidFill>
+                        </a:rPr>
+                        <a:t>Student ID</a:t>
+                      </a:r>
+                      <a:endParaRPr lang="en-US" dirty="0">
+                        <a:solidFill>
+                          <a:srgbClr val="080808"/>
+                        </a:solidFill>
+                      </a:endParaRPr>
+                    </a:p>
+                  </a:txBody>
+                  <a:tcPr/>
+                </a:tc>
+              </a:tr>
+              <a:tr h="0">
+                <a:tc>
+                  <a:txBody>
+                    <a:bodyPr/>
+                    <a:lstStyle/>
+                    <a:p>
+                      <a:pPr algn="ctr"/>
+                      <a:endParaRPr lang="en-US" dirty="0">
+                        <a:solidFill>
+                          <a:srgbClr val="080808"/>
+                        </a:solidFill>
+                      </a:endParaRPr>
+                    </a:p>
+                  </a:txBody>
+                  <a:tcPr/>
+                </a:tc>
+                <a:tc>
+                  <a:txBody>
+                    <a:bodyPr/>
+                    <a:lstStyle/>
+                    <a:p>
+                      <a:pPr algn="ctr"/>
+                      <a:endParaRPr lang="en-US" dirty="0">
+                        <a:solidFill>
+                          <a:srgbClr val="080808"/>
+                        </a:solidFill>
+                      </a:endParaRPr>
+                    </a:p>
+                  </a:txBody>
+                  <a:tcPr/>
+                </a:tc>
+              </a:tr>
+            </a:tbl>
+          </a:graphicData>
+        </a:graphic>
+      </p:graphicFrame>
+      <p:graphicFrame>
+        <p:nvGraphicFramePr>
+          <p:cNvPr id="10" name="Table 9"/>
+          <p:cNvGraphicFramePr>
+            <a:graphicFrameLocks noGrp="1"/>
+          </p:cNvGraphicFramePr>
+          <p:nvPr/>
+        </p:nvGraphicFramePr>
+        <p:xfrm>
+          <a:off x="685800" y="3886200"/>
+          <a:ext cx="7391400" cy="741680"/>
+        </p:xfrm>
+        <a:graphic>
+          <a:graphicData uri="http://schemas.openxmlformats.org/drawingml/2006/table">
+            <a:tbl>
+              <a:tblPr firstRow="1" bandRow="1">
+                <a:tableStyleId>{5C22544A-7EE6-4342-B048-85BDC9FD1C3A}</a:tableStyleId>
+              </a:tblPr>
+              <a:tblGrid>
+                <a:gridCol w="1231900"/>
+                <a:gridCol w="1231900"/>
+                <a:gridCol w="1231900"/>
+                <a:gridCol w="1231900"/>
+                <a:gridCol w="1231900"/>
+                <a:gridCol w="1231900"/>
+              </a:tblGrid>
+              <a:tr h="370840">
+                <a:tc>
+                  <a:txBody>
+                    <a:bodyPr/>
+                    <a:lstStyle/>
+                    <a:p>
+                      <a:pPr algn="ctr"/>
+                      <a:r>
+                        <a:rPr lang="en-US" dirty="0" err="1" smtClean="0">
+                          <a:solidFill>
+                            <a:srgbClr val="080808"/>
+                          </a:solidFill>
+                        </a:rPr>
+                        <a:t>RoomID</a:t>
+                      </a:r>
+                      <a:endParaRPr lang="en-US" dirty="0">
+                        <a:solidFill>
+                          <a:srgbClr val="080808"/>
+                        </a:solidFill>
+                      </a:endParaRPr>
+                    </a:p>
+                  </a:txBody>
+                  <a:tcPr/>
+                </a:tc>
+                <a:tc>
+                  <a:txBody>
+                    <a:bodyPr/>
+                    <a:lstStyle/>
+                    <a:p>
+                      <a:pPr algn="ctr"/>
+                      <a:r>
+                        <a:rPr lang="en-US" dirty="0" smtClean="0">
+                          <a:solidFill>
+                            <a:srgbClr val="080808"/>
+                          </a:solidFill>
+                        </a:rPr>
+                        <a:t>Day</a:t>
+                      </a:r>
+                      <a:endParaRPr lang="en-US" dirty="0">
+                        <a:solidFill>
+                          <a:srgbClr val="080808"/>
+                        </a:solidFill>
+                      </a:endParaRPr>
+                    </a:p>
+                  </a:txBody>
+                  <a:tcPr/>
+                </a:tc>
+                <a:tc>
+                  <a:txBody>
+                    <a:bodyPr/>
+                    <a:lstStyle/>
+                    <a:p>
+                      <a:pPr algn="ctr"/>
+                      <a:r>
+                        <a:rPr lang="en-US" dirty="0" smtClean="0">
+                          <a:solidFill>
+                            <a:srgbClr val="080808"/>
+                          </a:solidFill>
+                        </a:rPr>
+                        <a:t>Slot</a:t>
+                      </a:r>
+                      <a:endParaRPr lang="en-US" dirty="0">
+                        <a:solidFill>
+                          <a:srgbClr val="080808"/>
+                        </a:solidFill>
+                      </a:endParaRPr>
+                    </a:p>
+                  </a:txBody>
+                  <a:tcPr/>
+                </a:tc>
+                <a:tc>
+                  <a:txBody>
+                    <a:bodyPr/>
+                    <a:lstStyle/>
+                    <a:p>
+                      <a:pPr algn="ctr"/>
+                      <a:r>
+                        <a:rPr lang="en-US" dirty="0" smtClean="0">
+                          <a:solidFill>
+                            <a:srgbClr val="080808"/>
+                          </a:solidFill>
+                        </a:rPr>
+                        <a:t>Status</a:t>
+                      </a:r>
+                      <a:endParaRPr lang="en-US" dirty="0">
+                        <a:solidFill>
+                          <a:srgbClr val="080808"/>
+                        </a:solidFill>
+                      </a:endParaRPr>
+                    </a:p>
+                  </a:txBody>
+                  <a:tcPr/>
+                </a:tc>
+                <a:tc>
+                  <a:txBody>
+                    <a:bodyPr/>
+                    <a:lstStyle/>
+                    <a:p>
+                      <a:pPr algn="ctr"/>
+                      <a:r>
+                        <a:rPr lang="en-US" dirty="0" smtClean="0">
+                          <a:solidFill>
+                            <a:srgbClr val="080808"/>
+                          </a:solidFill>
+                        </a:rPr>
+                        <a:t>Capacity</a:t>
+                      </a:r>
+                      <a:endParaRPr lang="en-US" dirty="0">
+                        <a:solidFill>
+                          <a:srgbClr val="080808"/>
+                        </a:solidFill>
+                      </a:endParaRPr>
+                    </a:p>
+                  </a:txBody>
+                  <a:tcPr/>
+                </a:tc>
+                <a:tc>
+                  <a:txBody>
+                    <a:bodyPr/>
+                    <a:lstStyle/>
+                    <a:p>
+                      <a:pPr algn="ctr"/>
+                      <a:r>
+                        <a:rPr lang="en-US" dirty="0" smtClean="0">
+                          <a:solidFill>
+                            <a:srgbClr val="080808"/>
+                          </a:solidFill>
+                        </a:rPr>
+                        <a:t>Type</a:t>
+                      </a:r>
+                      <a:endParaRPr lang="en-US" dirty="0">
+                        <a:solidFill>
+                          <a:srgbClr val="080808"/>
+                        </a:solidFill>
+                      </a:endParaRPr>
+                    </a:p>
+                  </a:txBody>
+                  <a:tcPr/>
+                </a:tc>
+              </a:tr>
+              <a:tr h="370840">
+                <a:tc>
+                  <a:txBody>
+                    <a:bodyPr/>
+                    <a:lstStyle/>
+                    <a:p>
+                      <a:pPr algn="ctr"/>
+                      <a:endParaRPr lang="en-US" dirty="0">
+                        <a:solidFill>
+                          <a:srgbClr val="080808"/>
+                        </a:solidFill>
+                      </a:endParaRPr>
+                    </a:p>
+                  </a:txBody>
+                  <a:tcPr/>
+                </a:tc>
+                <a:tc>
+                  <a:txBody>
+                    <a:bodyPr/>
+                    <a:lstStyle/>
+                    <a:p>
+                      <a:pPr algn="ctr"/>
+                      <a:endParaRPr lang="en-US" dirty="0">
+                        <a:solidFill>
+                          <a:srgbClr val="080808"/>
+                        </a:solidFill>
+                      </a:endParaRPr>
+                    </a:p>
+                  </a:txBody>
+                  <a:tcPr/>
+                </a:tc>
+                <a:tc>
+                  <a:txBody>
+                    <a:bodyPr/>
+                    <a:lstStyle/>
+                    <a:p>
+                      <a:pPr algn="ctr"/>
+                      <a:endParaRPr lang="en-US">
+                        <a:solidFill>
+                          <a:srgbClr val="080808"/>
+                        </a:solidFill>
+                      </a:endParaRPr>
+                    </a:p>
+                  </a:txBody>
+                  <a:tcPr/>
+                </a:tc>
+                <a:tc>
+                  <a:txBody>
+                    <a:bodyPr/>
+                    <a:lstStyle/>
+                    <a:p>
+                      <a:pPr algn="ctr"/>
+                      <a:endParaRPr lang="en-US">
+                        <a:solidFill>
+                          <a:srgbClr val="080808"/>
+                        </a:solidFill>
+                      </a:endParaRPr>
+                    </a:p>
+                  </a:txBody>
+                  <a:tcPr/>
+                </a:tc>
+                <a:tc>
+                  <a:txBody>
+                    <a:bodyPr/>
+                    <a:lstStyle/>
+                    <a:p>
+                      <a:pPr algn="ctr"/>
+                      <a:endParaRPr lang="en-US" dirty="0">
+                        <a:solidFill>
+                          <a:srgbClr val="080808"/>
+                        </a:solidFill>
+                      </a:endParaRPr>
+                    </a:p>
+                  </a:txBody>
+                  <a:tcPr/>
+                </a:tc>
+                <a:tc>
+                  <a:txBody>
+                    <a:bodyPr/>
+                    <a:lstStyle/>
+                    <a:p>
+                      <a:pPr algn="ctr"/>
+                      <a:endParaRPr lang="en-US" dirty="0">
+                        <a:solidFill>
+                          <a:srgbClr val="080808"/>
+                        </a:solidFill>
+                      </a:endParaRPr>
+                    </a:p>
+                  </a:txBody>
+                  <a:tcPr/>
+                </a:tc>
+              </a:tr>
+            </a:tbl>
+          </a:graphicData>
+        </a:graphic>
+      </p:graphicFrame>
+      <p:graphicFrame>
+        <p:nvGraphicFramePr>
+          <p:cNvPr id="11" name="Table 10"/>
+          <p:cNvGraphicFramePr>
+            <a:graphicFrameLocks noGrp="1"/>
+          </p:cNvGraphicFramePr>
+          <p:nvPr/>
+        </p:nvGraphicFramePr>
+        <p:xfrm>
+          <a:off x="685800" y="5562600"/>
+          <a:ext cx="5913120" cy="741680"/>
+        </p:xfrm>
+        <a:graphic>
+          <a:graphicData uri="http://schemas.openxmlformats.org/drawingml/2006/table">
+            <a:tbl>
+              <a:tblPr firstRow="1" bandRow="1">
+                <a:tableStyleId>{5C22544A-7EE6-4342-B048-85BDC9FD1C3A}</a:tableStyleId>
+              </a:tblPr>
+              <a:tblGrid>
+                <a:gridCol w="1478280"/>
+                <a:gridCol w="1478280"/>
+                <a:gridCol w="1478280"/>
+                <a:gridCol w="1478280"/>
+              </a:tblGrid>
+              <a:tr h="370840">
+                <a:tc>
+                  <a:txBody>
+                    <a:bodyPr/>
+                    <a:lstStyle/>
+                    <a:p>
+                      <a:pPr algn="ctr"/>
+                      <a:r>
+                        <a:rPr lang="en-US" dirty="0" smtClean="0">
+                          <a:solidFill>
+                            <a:srgbClr val="080808"/>
+                          </a:solidFill>
+                        </a:rPr>
+                        <a:t>Room ID</a:t>
+                      </a:r>
+                      <a:endParaRPr lang="en-US" dirty="0">
+                        <a:solidFill>
+                          <a:srgbClr val="080808"/>
+                        </a:solidFill>
+                      </a:endParaRPr>
+                    </a:p>
+                  </a:txBody>
+                  <a:tcPr/>
+                </a:tc>
+                <a:tc>
+                  <a:txBody>
+                    <a:bodyPr/>
+                    <a:lstStyle/>
+                    <a:p>
+                      <a:pPr algn="ctr"/>
+                      <a:r>
+                        <a:rPr lang="en-US" dirty="0" smtClean="0">
+                          <a:solidFill>
+                            <a:srgbClr val="080808"/>
+                          </a:solidFill>
+                        </a:rPr>
+                        <a:t>Day</a:t>
+                      </a:r>
+                      <a:endParaRPr lang="en-US" dirty="0">
+                        <a:solidFill>
+                          <a:srgbClr val="080808"/>
+                        </a:solidFill>
+                      </a:endParaRPr>
+                    </a:p>
+                  </a:txBody>
+                  <a:tcPr/>
+                </a:tc>
+                <a:tc>
+                  <a:txBody>
+                    <a:bodyPr/>
+                    <a:lstStyle/>
+                    <a:p>
+                      <a:pPr algn="ctr"/>
+                      <a:r>
+                        <a:rPr lang="en-US" dirty="0" smtClean="0">
+                          <a:solidFill>
+                            <a:srgbClr val="080808"/>
+                          </a:solidFill>
+                        </a:rPr>
+                        <a:t>Slot</a:t>
+                      </a:r>
+                      <a:endParaRPr lang="en-US" dirty="0">
+                        <a:solidFill>
+                          <a:srgbClr val="080808"/>
+                        </a:solidFill>
+                      </a:endParaRPr>
+                    </a:p>
+                  </a:txBody>
+                  <a:tcPr/>
+                </a:tc>
+                <a:tc>
+                  <a:txBody>
+                    <a:bodyPr/>
+                    <a:lstStyle/>
+                    <a:p>
+                      <a:pPr algn="ctr"/>
+                      <a:r>
+                        <a:rPr lang="en-US" dirty="0" smtClean="0">
+                          <a:solidFill>
+                            <a:srgbClr val="080808"/>
+                          </a:solidFill>
+                        </a:rPr>
+                        <a:t>Course ID</a:t>
+                      </a:r>
+                      <a:endParaRPr lang="en-US" dirty="0">
+                        <a:solidFill>
+                          <a:srgbClr val="080808"/>
+                        </a:solidFill>
+                      </a:endParaRPr>
+                    </a:p>
+                  </a:txBody>
+                  <a:tcPr/>
+                </a:tc>
+              </a:tr>
+              <a:tr h="370840">
+                <a:tc>
+                  <a:txBody>
+                    <a:bodyPr/>
+                    <a:lstStyle/>
+                    <a:p>
+                      <a:pPr algn="ctr"/>
+                      <a:endParaRPr lang="en-US" dirty="0">
+                        <a:solidFill>
+                          <a:srgbClr val="080808"/>
+                        </a:solidFill>
+                      </a:endParaRPr>
+                    </a:p>
+                  </a:txBody>
+                  <a:tcPr/>
+                </a:tc>
+                <a:tc>
+                  <a:txBody>
+                    <a:bodyPr/>
+                    <a:lstStyle/>
+                    <a:p>
+                      <a:pPr algn="ctr"/>
+                      <a:endParaRPr lang="en-US">
+                        <a:solidFill>
+                          <a:srgbClr val="080808"/>
+                        </a:solidFill>
+                      </a:endParaRPr>
+                    </a:p>
+                  </a:txBody>
+                  <a:tcPr/>
+                </a:tc>
+                <a:tc>
+                  <a:txBody>
+                    <a:bodyPr/>
+                    <a:lstStyle/>
+                    <a:p>
+                      <a:pPr algn="ctr"/>
+                      <a:endParaRPr lang="en-US">
+                        <a:solidFill>
+                          <a:srgbClr val="080808"/>
+                        </a:solidFill>
+                      </a:endParaRPr>
+                    </a:p>
+                  </a:txBody>
+                  <a:tcPr/>
+                </a:tc>
+                <a:tc>
+                  <a:txBody>
+                    <a:bodyPr/>
+                    <a:lstStyle/>
+                    <a:p>
+                      <a:pPr algn="ctr"/>
+                      <a:endParaRPr lang="en-US" dirty="0">
+                        <a:solidFill>
+                          <a:srgbClr val="080808"/>
+                        </a:solidFill>
+                      </a:endParaRPr>
+                    </a:p>
+                  </a:txBody>
+                  <a:tcPr/>
+                </a:tc>
+              </a:tr>
+            </a:tbl>
+          </a:graphicData>
+        </a:graphic>
+      </p:graphicFrame>
+    </p:spTree>
+  </p:cSld>
+  <p:clrMapOvr>
+    <a:masterClrMapping/>
+  </p:clrMapOvr>
+  <p:timing>
+    <p:tnLst>
+      <p:par>
+        <p:cTn id="1" dur="indefinite" restart="never" nodeType="tmRoot"/>
+      </p:par>
+    </p:tnLst>
+  </p:timing>
+</p:sld>
+</file>
+
+<file path=ppt/slides/slide6.xml><?xml version="1.0" encoding="utf-8"?>
+<p:sld xmlns:a="http://schemas.openxmlformats.org/drawingml/2006/main" xmlns:r="http://schemas.openxmlformats.org/officeDocument/2006/relationships" xmlns:p="http://schemas.openxmlformats.org/presentationml/2006/main">
+  <p:cSld>
+    <p:spTree>
+      <p:nvGrpSpPr>
+        <p:cNvPr id="1" name=""/>
+        <p:cNvGrpSpPr/>
+        <p:nvPr/>
+      </p:nvGrpSpPr>
+      <p:grpSpPr>
+        <a:xfrm>
+          <a:off x="0" y="0"/>
+          <a:ext cx="0" cy="0"/>
+          <a:chOff x="0" y="0"/>
+          <a:chExt cx="0" cy="0"/>
+        </a:xfrm>
+      </p:grpSpPr>
+      <p:sp>
+        <p:nvSpPr>
+          <p:cNvPr id="2" name="Title 1"/>
+          <p:cNvSpPr>
+            <a:spLocks noGrp="1"/>
+          </p:cNvSpPr>
+          <p:nvPr>
+            <p:ph type="title"/>
+          </p:nvPr>
+        </p:nvSpPr>
+        <p:spPr>
+          <a:xfrm>
+            <a:off x="457200" y="274638"/>
+            <a:ext cx="8229600" cy="792162"/>
+          </a:xfrm>
+        </p:spPr>
+        <p:txBody>
+          <a:bodyPr>
+            <a:normAutofit fontScale="90000"/>
+          </a:bodyPr>
+          <a:lstStyle/>
+          <a:p>
+            <a:r>
+              <a:rPr lang="en-US" sz="5000" dirty="0" smtClean="0">
+                <a:solidFill>
+                  <a:srgbClr val="080808"/>
+                </a:solidFill>
+                <a:latin typeface="Bookman Old Style" pitchFamily="18" charset="0"/>
+              </a:rPr>
+              <a:t>E-R Diagram</a:t>
+            </a:r>
+            <a:endParaRPr lang="en-US" sz="5000" dirty="0">
+              <a:solidFill>
+                <a:srgbClr val="080808"/>
+              </a:solidFill>
+              <a:latin typeface="Bookman Old Style" pitchFamily="18" charset="0"/>
+            </a:endParaRPr>
+          </a:p>
+        </p:txBody>
+      </p:sp>
+      <p:sp>
+        <p:nvSpPr>
+          <p:cNvPr id="14" name="Rectangle 13"/>
+          <p:cNvSpPr/>
+          <p:nvPr/>
+        </p:nvSpPr>
+        <p:spPr>
+          <a:xfrm>
+            <a:off x="5562600" y="5105400"/>
+            <a:ext cx="1905000" cy="533400"/>
+          </a:xfrm>
+          <a:prstGeom prst="rect">
+            <a:avLst/>
+          </a:prstGeom>
+        </p:spPr>
+        <p:style>
+          <a:lnRef idx="1">
+            <a:schemeClr val="accent4"/>
+          </a:lnRef>
+          <a:fillRef idx="2">
+            <a:schemeClr val="accent4"/>
+          </a:fillRef>
+          <a:effectRef idx="1">
+            <a:schemeClr val="accent4"/>
+          </a:effectRef>
+          <a:fontRef idx="minor">
+            <a:schemeClr val="dk1"/>
+          </a:fontRef>
+        </p:style>
+        <p:txBody>
+          <a:bodyPr rtlCol="0" anchor="ctr"/>
+          <a:lstStyle/>
+          <a:p>
+            <a:pPr algn="ctr"/>
+            <a:r>
+              <a:rPr lang="en-US" sz="2200" dirty="0" smtClean="0">
+                <a:solidFill>
+                  <a:srgbClr val="080808"/>
+                </a:solidFill>
+              </a:rPr>
+              <a:t>Room</a:t>
+            </a:r>
+            <a:endParaRPr lang="en-US" sz="2200" dirty="0">
+              <a:solidFill>
+                <a:srgbClr val="080808"/>
+              </a:solidFill>
+            </a:endParaRPr>
+          </a:p>
+        </p:txBody>
+      </p:sp>
+      <p:sp>
+        <p:nvSpPr>
+          <p:cNvPr id="15" name="Rectangle 14"/>
+          <p:cNvSpPr/>
+          <p:nvPr/>
+        </p:nvSpPr>
+        <p:spPr>
+          <a:xfrm>
+            <a:off x="5334000" y="2667000"/>
+            <a:ext cx="2133600" cy="533400"/>
+          </a:xfrm>
+          <a:prstGeom prst="rect">
+            <a:avLst/>
+          </a:prstGeom>
+        </p:spPr>
+        <p:style>
+          <a:lnRef idx="1">
+            <a:schemeClr val="accent4"/>
+          </a:lnRef>
+          <a:fillRef idx="2">
+            <a:schemeClr val="accent4"/>
+          </a:fillRef>
+          <a:effectRef idx="1">
+            <a:schemeClr val="accent4"/>
+          </a:effectRef>
+          <a:fontRef idx="minor">
+            <a:schemeClr val="dk1"/>
+          </a:fontRef>
+        </p:style>
+        <p:txBody>
+          <a:bodyPr rtlCol="0" anchor="ctr"/>
+          <a:lstStyle/>
+          <a:p>
+            <a:pPr algn="ctr"/>
+            <a:r>
+              <a:rPr lang="en-US" sz="2200" dirty="0" smtClean="0">
+                <a:solidFill>
+                  <a:srgbClr val="080808"/>
+                </a:solidFill>
+              </a:rPr>
+              <a:t>Course</a:t>
+            </a:r>
+            <a:endParaRPr lang="en-US" sz="2200" dirty="0">
+              <a:solidFill>
+                <a:srgbClr val="080808"/>
+              </a:solidFill>
+            </a:endParaRPr>
+          </a:p>
+        </p:txBody>
+      </p:sp>
+      <p:sp>
+        <p:nvSpPr>
+          <p:cNvPr id="16" name="Rectangle 15"/>
+          <p:cNvSpPr/>
+          <p:nvPr/>
+        </p:nvSpPr>
+        <p:spPr>
+          <a:xfrm>
+            <a:off x="457200" y="2667000"/>
+            <a:ext cx="2133600" cy="533400"/>
+          </a:xfrm>
+          <a:prstGeom prst="rect">
+            <a:avLst/>
+          </a:prstGeom>
+        </p:spPr>
+        <p:style>
+          <a:lnRef idx="1">
+            <a:schemeClr val="accent4"/>
+          </a:lnRef>
+          <a:fillRef idx="2">
+            <a:schemeClr val="accent4"/>
+          </a:fillRef>
+          <a:effectRef idx="1">
+            <a:schemeClr val="accent4"/>
+          </a:effectRef>
+          <a:fontRef idx="minor">
+            <a:schemeClr val="dk1"/>
+          </a:fontRef>
+        </p:style>
+        <p:txBody>
+          <a:bodyPr rtlCol="0" anchor="ctr"/>
+          <a:lstStyle/>
+          <a:p>
+            <a:pPr algn="ctr"/>
+            <a:r>
+              <a:rPr lang="en-US" sz="2200" dirty="0" smtClean="0">
+                <a:solidFill>
+                  <a:srgbClr val="080808"/>
+                </a:solidFill>
+              </a:rPr>
+              <a:t>Student</a:t>
+            </a:r>
+            <a:endParaRPr lang="en-US" sz="2200" dirty="0">
+              <a:solidFill>
+                <a:srgbClr val="080808"/>
+              </a:solidFill>
+            </a:endParaRPr>
+          </a:p>
+        </p:txBody>
+      </p:sp>
+      <p:sp>
+        <p:nvSpPr>
+          <p:cNvPr id="17" name="Oval 16"/>
+          <p:cNvSpPr/>
+          <p:nvPr/>
+        </p:nvSpPr>
+        <p:spPr>
+          <a:xfrm>
+            <a:off x="381000" y="1447800"/>
+            <a:ext cx="1295400" cy="609600"/>
+          </a:xfrm>
+          <a:prstGeom prst="ellipse">
+            <a:avLst/>
+          </a:prstGeom>
+        </p:spPr>
+        <p:style>
+          <a:lnRef idx="1">
+            <a:schemeClr val="dk1"/>
+          </a:lnRef>
+          <a:fillRef idx="2">
+            <a:schemeClr val="dk1"/>
+          </a:fillRef>
+          <a:effectRef idx="1">
+            <a:schemeClr val="dk1"/>
+          </a:effectRef>
+          <a:fontRef idx="minor">
+            <a:schemeClr val="dk1"/>
+          </a:fontRef>
+        </p:style>
+        <p:txBody>
+          <a:bodyPr rtlCol="0" anchor="ctr"/>
+          <a:lstStyle/>
+          <a:p>
+            <a:pPr algn="ctr"/>
+            <a:r>
+              <a:rPr lang="en-US" dirty="0" smtClean="0">
+                <a:solidFill>
+                  <a:srgbClr val="080808"/>
+                </a:solidFill>
+              </a:rPr>
+              <a:t>Course ID</a:t>
+            </a:r>
+            <a:endParaRPr lang="en-US" dirty="0">
+              <a:solidFill>
+                <a:srgbClr val="080808"/>
+              </a:solidFill>
+            </a:endParaRPr>
+          </a:p>
+        </p:txBody>
+      </p:sp>
+      <p:sp>
+        <p:nvSpPr>
+          <p:cNvPr id="18" name="Oval 17"/>
+          <p:cNvSpPr/>
+          <p:nvPr/>
+        </p:nvSpPr>
+        <p:spPr>
+          <a:xfrm>
+            <a:off x="1981200" y="1447800"/>
+            <a:ext cx="1447800" cy="609600"/>
+          </a:xfrm>
+          <a:prstGeom prst="ellipse">
+            <a:avLst/>
+          </a:prstGeom>
+        </p:spPr>
+        <p:style>
+          <a:lnRef idx="1">
+            <a:schemeClr val="dk1"/>
+          </a:lnRef>
+          <a:fillRef idx="2">
+            <a:schemeClr val="dk1"/>
+          </a:fillRef>
+          <a:effectRef idx="1">
+            <a:schemeClr val="dk1"/>
+          </a:effectRef>
+          <a:fontRef idx="minor">
+            <a:schemeClr val="dk1"/>
+          </a:fontRef>
+        </p:style>
+        <p:txBody>
+          <a:bodyPr rtlCol="0" anchor="ctr"/>
+          <a:lstStyle/>
+          <a:p>
+            <a:pPr algn="ctr"/>
+            <a:r>
+              <a:rPr lang="en-US" dirty="0" smtClean="0">
+                <a:solidFill>
+                  <a:srgbClr val="080808"/>
+                </a:solidFill>
+              </a:rPr>
+              <a:t>Student ID</a:t>
+            </a:r>
+            <a:endParaRPr lang="en-US" dirty="0">
+              <a:solidFill>
+                <a:srgbClr val="080808"/>
+              </a:solidFill>
+            </a:endParaRPr>
+          </a:p>
+        </p:txBody>
+      </p:sp>
+      <p:sp>
+        <p:nvSpPr>
+          <p:cNvPr id="19" name="Oval 18"/>
+          <p:cNvSpPr/>
+          <p:nvPr/>
+        </p:nvSpPr>
+        <p:spPr>
+          <a:xfrm>
+            <a:off x="4038600" y="1447800"/>
+            <a:ext cx="1295400" cy="609600"/>
+          </a:xfrm>
+          <a:prstGeom prst="ellipse">
+            <a:avLst/>
+          </a:prstGeom>
+        </p:spPr>
+        <p:style>
+          <a:lnRef idx="1">
+            <a:schemeClr val="dk1"/>
+          </a:lnRef>
+          <a:fillRef idx="2">
+            <a:schemeClr val="dk1"/>
+          </a:fillRef>
+          <a:effectRef idx="1">
+            <a:schemeClr val="dk1"/>
+          </a:effectRef>
+          <a:fontRef idx="minor">
+            <a:schemeClr val="dk1"/>
+          </a:fontRef>
+        </p:style>
+        <p:txBody>
+          <a:bodyPr rtlCol="0" anchor="ctr"/>
+          <a:lstStyle/>
+          <a:p>
+            <a:pPr algn="ctr"/>
+            <a:r>
+              <a:rPr lang="en-US" dirty="0" smtClean="0">
+                <a:solidFill>
+                  <a:srgbClr val="080808"/>
+                </a:solidFill>
+              </a:rPr>
+              <a:t>Course ID</a:t>
+            </a:r>
+            <a:endParaRPr lang="en-US" dirty="0">
+              <a:solidFill>
+                <a:srgbClr val="080808"/>
+              </a:solidFill>
+            </a:endParaRPr>
+          </a:p>
+        </p:txBody>
+      </p:sp>
+      <p:sp>
+        <p:nvSpPr>
+          <p:cNvPr id="20" name="Oval 19"/>
+          <p:cNvSpPr/>
+          <p:nvPr/>
+        </p:nvSpPr>
+        <p:spPr>
+          <a:xfrm>
+            <a:off x="5562600" y="1447800"/>
+            <a:ext cx="1447800" cy="609600"/>
+          </a:xfrm>
+          <a:prstGeom prst="ellipse">
+            <a:avLst/>
+          </a:prstGeom>
+        </p:spPr>
+        <p:style>
+          <a:lnRef idx="1">
+            <a:schemeClr val="dk1"/>
+          </a:lnRef>
+          <a:fillRef idx="2">
+            <a:schemeClr val="dk1"/>
+          </a:fillRef>
+          <a:effectRef idx="1">
+            <a:schemeClr val="dk1"/>
+          </a:effectRef>
+          <a:fontRef idx="minor">
+            <a:schemeClr val="dk1"/>
+          </a:fontRef>
+        </p:style>
+        <p:txBody>
+          <a:bodyPr rtlCol="0" anchor="ctr"/>
+          <a:lstStyle/>
+          <a:p>
+            <a:pPr algn="ctr"/>
+            <a:r>
+              <a:rPr lang="en-US" dirty="0" smtClean="0">
+                <a:solidFill>
+                  <a:srgbClr val="080808"/>
+                </a:solidFill>
+              </a:rPr>
+              <a:t>Teacher ID</a:t>
+            </a:r>
+            <a:endParaRPr lang="en-US" dirty="0">
+              <a:solidFill>
+                <a:srgbClr val="080808"/>
+              </a:solidFill>
+            </a:endParaRPr>
+          </a:p>
+        </p:txBody>
+      </p:sp>
+      <p:sp>
+        <p:nvSpPr>
+          <p:cNvPr id="21" name="Oval 20"/>
+          <p:cNvSpPr/>
+          <p:nvPr/>
+        </p:nvSpPr>
+        <p:spPr>
+          <a:xfrm>
+            <a:off x="6934200" y="990600"/>
+            <a:ext cx="1066800" cy="609600"/>
+          </a:xfrm>
+          <a:prstGeom prst="ellipse">
+            <a:avLst/>
+          </a:prstGeom>
+        </p:spPr>
+        <p:style>
+          <a:lnRef idx="1">
+            <a:schemeClr val="dk1"/>
+          </a:lnRef>
+          <a:fillRef idx="2">
+            <a:schemeClr val="dk1"/>
+          </a:fillRef>
+          <a:effectRef idx="1">
+            <a:schemeClr val="dk1"/>
+          </a:effectRef>
+          <a:fontRef idx="minor">
+            <a:schemeClr val="dk1"/>
+          </a:fontRef>
+        </p:style>
+        <p:txBody>
+          <a:bodyPr rtlCol="0" anchor="ctr"/>
+          <a:lstStyle/>
+          <a:p>
+            <a:pPr algn="ctr"/>
+            <a:r>
+              <a:rPr lang="en-US" dirty="0" smtClean="0">
+                <a:solidFill>
+                  <a:srgbClr val="080808"/>
+                </a:solidFill>
+              </a:rPr>
+              <a:t>Slot</a:t>
+            </a:r>
+            <a:endParaRPr lang="en-US" dirty="0">
+              <a:solidFill>
+                <a:srgbClr val="080808"/>
+              </a:solidFill>
+            </a:endParaRPr>
+          </a:p>
+        </p:txBody>
+      </p:sp>
+      <p:sp>
+        <p:nvSpPr>
+          <p:cNvPr id="22" name="Oval 21"/>
+          <p:cNvSpPr/>
+          <p:nvPr/>
+        </p:nvSpPr>
+        <p:spPr>
+          <a:xfrm>
+            <a:off x="7467600" y="1752600"/>
+            <a:ext cx="1143000" cy="457200"/>
+          </a:xfrm>
+          <a:prstGeom prst="ellipse">
+            <a:avLst/>
+          </a:prstGeom>
+        </p:spPr>
+        <p:style>
+          <a:lnRef idx="1">
+            <a:schemeClr val="dk1"/>
+          </a:lnRef>
+          <a:fillRef idx="2">
+            <a:schemeClr val="dk1"/>
+          </a:fillRef>
+          <a:effectRef idx="1">
+            <a:schemeClr val="dk1"/>
+          </a:effectRef>
+          <a:fontRef idx="minor">
+            <a:schemeClr val="dk1"/>
+          </a:fontRef>
+        </p:style>
+        <p:txBody>
+          <a:bodyPr rtlCol="0" anchor="ctr"/>
+          <a:lstStyle/>
+          <a:p>
+            <a:pPr algn="ctr"/>
+            <a:r>
+              <a:rPr lang="en-US" dirty="0" smtClean="0">
+                <a:solidFill>
+                  <a:srgbClr val="080808"/>
+                </a:solidFill>
+              </a:rPr>
+              <a:t>Batch</a:t>
+            </a:r>
+            <a:endParaRPr lang="en-US" dirty="0">
+              <a:solidFill>
+                <a:srgbClr val="080808"/>
+              </a:solidFill>
+            </a:endParaRPr>
+          </a:p>
+        </p:txBody>
+      </p:sp>
+      <p:sp>
+        <p:nvSpPr>
+          <p:cNvPr id="23" name="Oval 22"/>
+          <p:cNvSpPr/>
+          <p:nvPr/>
+        </p:nvSpPr>
+        <p:spPr>
+          <a:xfrm>
+            <a:off x="7848600" y="2362200"/>
+            <a:ext cx="1066800" cy="609600"/>
+          </a:xfrm>
+          <a:prstGeom prst="ellipse">
+            <a:avLst/>
+          </a:prstGeom>
+        </p:spPr>
+        <p:style>
+          <a:lnRef idx="1">
+            <a:schemeClr val="dk1"/>
+          </a:lnRef>
+          <a:fillRef idx="2">
+            <a:schemeClr val="dk1"/>
+          </a:fillRef>
+          <a:effectRef idx="1">
+            <a:schemeClr val="dk1"/>
+          </a:effectRef>
+          <a:fontRef idx="minor">
+            <a:schemeClr val="dk1"/>
+          </a:fontRef>
+        </p:style>
+        <p:txBody>
+          <a:bodyPr rtlCol="0" anchor="ctr"/>
+          <a:lstStyle/>
+          <a:p>
+            <a:pPr algn="ctr"/>
+            <a:r>
+              <a:rPr lang="en-US" dirty="0" smtClean="0">
+                <a:solidFill>
+                  <a:srgbClr val="080808"/>
+                </a:solidFill>
+              </a:rPr>
+              <a:t>Type</a:t>
+            </a:r>
+            <a:endParaRPr lang="en-US" dirty="0">
+              <a:solidFill>
+                <a:srgbClr val="080808"/>
+              </a:solidFill>
+            </a:endParaRPr>
+          </a:p>
+        </p:txBody>
+      </p:sp>
+      <p:sp>
+        <p:nvSpPr>
+          <p:cNvPr id="24" name="Oval 23"/>
+          <p:cNvSpPr/>
+          <p:nvPr/>
+        </p:nvSpPr>
+        <p:spPr>
+          <a:xfrm>
+            <a:off x="3048000" y="5943600"/>
+            <a:ext cx="1295400" cy="609600"/>
+          </a:xfrm>
+          <a:prstGeom prst="ellipse">
+            <a:avLst/>
+          </a:prstGeom>
+        </p:spPr>
+        <p:style>
+          <a:lnRef idx="1">
+            <a:schemeClr val="dk1"/>
+          </a:lnRef>
+          <a:fillRef idx="2">
+            <a:schemeClr val="dk1"/>
+          </a:fillRef>
+          <a:effectRef idx="1">
+            <a:schemeClr val="dk1"/>
+          </a:effectRef>
+          <a:fontRef idx="minor">
+            <a:schemeClr val="dk1"/>
+          </a:fontRef>
+        </p:style>
+        <p:txBody>
+          <a:bodyPr rtlCol="0" anchor="ctr"/>
+          <a:lstStyle/>
+          <a:p>
+            <a:pPr algn="ctr"/>
+            <a:r>
+              <a:rPr lang="en-US" dirty="0" smtClean="0">
+                <a:solidFill>
+                  <a:srgbClr val="080808"/>
+                </a:solidFill>
+              </a:rPr>
+              <a:t>Room ID</a:t>
+            </a:r>
+            <a:endParaRPr lang="en-US" dirty="0">
+              <a:solidFill>
+                <a:srgbClr val="080808"/>
+              </a:solidFill>
+            </a:endParaRPr>
+          </a:p>
+        </p:txBody>
+      </p:sp>
+      <p:sp>
+        <p:nvSpPr>
+          <p:cNvPr id="25" name="Flowchart: Decision 24"/>
+          <p:cNvSpPr/>
+          <p:nvPr/>
+        </p:nvSpPr>
+        <p:spPr>
+          <a:xfrm>
+            <a:off x="3505200" y="2514600"/>
+            <a:ext cx="1295400" cy="914400"/>
+          </a:xfrm>
+          <a:prstGeom prst="flowChartDecision">
+            <a:avLst/>
+          </a:prstGeom>
+        </p:spPr>
+        <p:style>
+          <a:lnRef idx="1">
+            <a:schemeClr val="accent4"/>
+          </a:lnRef>
+          <a:fillRef idx="2">
+            <a:schemeClr val="accent4"/>
+          </a:fillRef>
+          <a:effectRef idx="1">
+            <a:schemeClr val="accent4"/>
+          </a:effectRef>
+          <a:fontRef idx="minor">
+            <a:schemeClr val="dk1"/>
+          </a:fontRef>
+        </p:style>
+        <p:txBody>
+          <a:bodyPr rtlCol="0" anchor="ctr"/>
+          <a:lstStyle/>
+          <a:p>
+            <a:pPr algn="ctr"/>
+            <a:r>
+              <a:rPr lang="en-US" dirty="0" smtClean="0">
+                <a:solidFill>
+                  <a:srgbClr val="080808"/>
+                </a:solidFill>
+              </a:rPr>
+              <a:t>Has</a:t>
+            </a:r>
+            <a:endParaRPr lang="en-US" dirty="0">
+              <a:solidFill>
+                <a:srgbClr val="080808"/>
+              </a:solidFill>
+            </a:endParaRPr>
+          </a:p>
+        </p:txBody>
+      </p:sp>
+      <p:sp>
+        <p:nvSpPr>
+          <p:cNvPr id="26" name="Flowchart: Decision 25"/>
+          <p:cNvSpPr/>
+          <p:nvPr/>
+        </p:nvSpPr>
+        <p:spPr>
+          <a:xfrm>
+            <a:off x="5486400" y="3733800"/>
+            <a:ext cx="1981200" cy="914400"/>
+          </a:xfrm>
+          <a:prstGeom prst="flowChartDecision">
+            <a:avLst/>
+          </a:prstGeom>
+        </p:spPr>
+        <p:style>
+          <a:lnRef idx="1">
+            <a:schemeClr val="accent4"/>
+          </a:lnRef>
+          <a:fillRef idx="2">
+            <a:schemeClr val="accent4"/>
+          </a:fillRef>
+          <a:effectRef idx="1">
+            <a:schemeClr val="accent4"/>
+          </a:effectRef>
+          <a:fontRef idx="minor">
+            <a:schemeClr val="dk1"/>
+          </a:fontRef>
+        </p:style>
+        <p:txBody>
+          <a:bodyPr rtlCol="0" anchor="ctr"/>
+          <a:lstStyle/>
+          <a:p>
+            <a:pPr algn="ctr"/>
+            <a:r>
+              <a:rPr lang="en-US" dirty="0" smtClean="0">
+                <a:solidFill>
+                  <a:srgbClr val="080808"/>
+                </a:solidFill>
+              </a:rPr>
+              <a:t>Routine</a:t>
+            </a:r>
+            <a:endParaRPr lang="en-US" dirty="0">
+              <a:solidFill>
+                <a:srgbClr val="080808"/>
+              </a:solidFill>
+            </a:endParaRPr>
+          </a:p>
+        </p:txBody>
+      </p:sp>
+      <p:sp>
+        <p:nvSpPr>
+          <p:cNvPr id="27" name="Oval 26"/>
+          <p:cNvSpPr/>
+          <p:nvPr/>
+        </p:nvSpPr>
+        <p:spPr>
+          <a:xfrm>
+            <a:off x="4572000" y="6248400"/>
+            <a:ext cx="990600" cy="609600"/>
+          </a:xfrm>
+          <a:prstGeom prst="ellipse">
+            <a:avLst/>
+          </a:prstGeom>
+        </p:spPr>
+        <p:style>
+          <a:lnRef idx="1">
+            <a:schemeClr val="dk1"/>
+          </a:lnRef>
+          <a:fillRef idx="2">
+            <a:schemeClr val="dk1"/>
+          </a:fillRef>
+          <a:effectRef idx="1">
+            <a:schemeClr val="dk1"/>
+          </a:effectRef>
+          <a:fontRef idx="minor">
+            <a:schemeClr val="dk1"/>
+          </a:fontRef>
+        </p:style>
+        <p:txBody>
+          <a:bodyPr rtlCol="0" anchor="ctr"/>
+          <a:lstStyle/>
+          <a:p>
+            <a:pPr algn="ctr"/>
+            <a:r>
+              <a:rPr lang="en-US" dirty="0" smtClean="0">
+                <a:solidFill>
+                  <a:srgbClr val="080808"/>
+                </a:solidFill>
+              </a:rPr>
+              <a:t>Day</a:t>
+            </a:r>
+            <a:endParaRPr lang="en-US" dirty="0">
+              <a:solidFill>
+                <a:srgbClr val="080808"/>
+              </a:solidFill>
+            </a:endParaRPr>
+          </a:p>
+        </p:txBody>
+      </p:sp>
+      <p:sp>
+        <p:nvSpPr>
+          <p:cNvPr id="28" name="Oval 27"/>
+          <p:cNvSpPr/>
+          <p:nvPr/>
+        </p:nvSpPr>
+        <p:spPr>
+          <a:xfrm>
+            <a:off x="5562600" y="6248400"/>
+            <a:ext cx="990600" cy="609600"/>
+          </a:xfrm>
+          <a:prstGeom prst="ellipse">
+            <a:avLst/>
+          </a:prstGeom>
+        </p:spPr>
+        <p:style>
+          <a:lnRef idx="1">
+            <a:schemeClr val="dk1"/>
+          </a:lnRef>
+          <a:fillRef idx="2">
+            <a:schemeClr val="dk1"/>
+          </a:fillRef>
+          <a:effectRef idx="1">
+            <a:schemeClr val="dk1"/>
+          </a:effectRef>
+          <a:fontRef idx="minor">
+            <a:schemeClr val="dk1"/>
+          </a:fontRef>
+        </p:style>
+        <p:txBody>
+          <a:bodyPr rtlCol="0" anchor="ctr"/>
+          <a:lstStyle/>
+          <a:p>
+            <a:pPr algn="ctr"/>
+            <a:r>
+              <a:rPr lang="en-US" dirty="0" smtClean="0">
+                <a:solidFill>
+                  <a:srgbClr val="080808"/>
+                </a:solidFill>
+              </a:rPr>
+              <a:t>Slot</a:t>
+            </a:r>
+            <a:endParaRPr lang="en-US" dirty="0">
+              <a:solidFill>
+                <a:srgbClr val="080808"/>
+              </a:solidFill>
+            </a:endParaRPr>
+          </a:p>
+        </p:txBody>
+      </p:sp>
+      <p:sp>
+        <p:nvSpPr>
+          <p:cNvPr id="29" name="Oval 28"/>
+          <p:cNvSpPr/>
+          <p:nvPr/>
+        </p:nvSpPr>
+        <p:spPr>
+          <a:xfrm>
+            <a:off x="6705600" y="6019800"/>
+            <a:ext cx="1143000" cy="609600"/>
+          </a:xfrm>
+          <a:prstGeom prst="ellipse">
+            <a:avLst/>
+          </a:prstGeom>
+        </p:spPr>
+        <p:style>
+          <a:lnRef idx="1">
+            <a:schemeClr val="dk1"/>
+          </a:lnRef>
+          <a:fillRef idx="2">
+            <a:schemeClr val="dk1"/>
+          </a:fillRef>
+          <a:effectRef idx="1">
+            <a:schemeClr val="dk1"/>
+          </a:effectRef>
+          <a:fontRef idx="minor">
+            <a:schemeClr val="dk1"/>
+          </a:fontRef>
+        </p:style>
+        <p:txBody>
+          <a:bodyPr rtlCol="0" anchor="ctr"/>
+          <a:lstStyle/>
+          <a:p>
+            <a:pPr algn="ctr"/>
+            <a:r>
+              <a:rPr lang="en-US" dirty="0" smtClean="0">
+                <a:solidFill>
+                  <a:srgbClr val="080808"/>
+                </a:solidFill>
+              </a:rPr>
+              <a:t>Status</a:t>
+            </a:r>
+            <a:endParaRPr lang="en-US" dirty="0">
+              <a:solidFill>
+                <a:srgbClr val="080808"/>
+              </a:solidFill>
+            </a:endParaRPr>
+          </a:p>
+        </p:txBody>
+      </p:sp>
+      <p:sp>
+        <p:nvSpPr>
+          <p:cNvPr id="30" name="Oval 29"/>
+          <p:cNvSpPr/>
+          <p:nvPr/>
+        </p:nvSpPr>
+        <p:spPr>
+          <a:xfrm>
+            <a:off x="7848600" y="5638800"/>
+            <a:ext cx="990600" cy="609600"/>
+          </a:xfrm>
+          <a:prstGeom prst="ellipse">
+            <a:avLst/>
+          </a:prstGeom>
+        </p:spPr>
+        <p:style>
+          <a:lnRef idx="1">
+            <a:schemeClr val="dk1"/>
+          </a:lnRef>
+          <a:fillRef idx="2">
+            <a:schemeClr val="dk1"/>
+          </a:fillRef>
+          <a:effectRef idx="1">
+            <a:schemeClr val="dk1"/>
+          </a:effectRef>
+          <a:fontRef idx="minor">
+            <a:schemeClr val="dk1"/>
+          </a:fontRef>
+        </p:style>
+        <p:txBody>
+          <a:bodyPr rtlCol="0" anchor="ctr"/>
+          <a:lstStyle/>
+          <a:p>
+            <a:pPr algn="ctr"/>
+            <a:r>
+              <a:rPr lang="en-US" dirty="0" smtClean="0">
+                <a:solidFill>
+                  <a:srgbClr val="080808"/>
+                </a:solidFill>
+              </a:rPr>
+              <a:t>Type</a:t>
+            </a:r>
+            <a:endParaRPr lang="en-US" dirty="0">
+              <a:solidFill>
+                <a:srgbClr val="080808"/>
+              </a:solidFill>
+            </a:endParaRPr>
+          </a:p>
+        </p:txBody>
+      </p:sp>
+      <p:cxnSp>
+        <p:nvCxnSpPr>
+          <p:cNvPr id="32" name="Straight Connector 31"/>
+          <p:cNvCxnSpPr>
+            <a:stCxn id="17" idx="4"/>
+            <a:endCxn id="16" idx="0"/>
+          </p:cNvCxnSpPr>
+          <p:nvPr/>
+        </p:nvCxnSpPr>
+        <p:spPr>
+          <a:xfrm rot="16200000" flipH="1">
+            <a:off x="971550" y="2114550"/>
+            <a:ext cx="609600" cy="495300"/>
+          </a:xfrm>
+          <a:prstGeom prst="line">
+            <a:avLst/>
+          </a:prstGeom>
+          <a:ln>
+            <a:solidFill>
+              <a:schemeClr val="bg1">
+                <a:lumMod val="75000"/>
+                <a:lumOff val="25000"/>
+              </a:schemeClr>
+            </a:solidFill>
+          </a:ln>
+          <a:effectLst>
+            <a:glow rad="139700">
+              <a:schemeClr val="accent5">
+                <a:satMod val="175000"/>
+                <a:alpha val="40000"/>
+              </a:schemeClr>
+            </a:glow>
+          </a:effectLst>
+        </p:spPr>
+        <p:style>
+          <a:lnRef idx="1">
+            <a:schemeClr val="accent1"/>
+          </a:lnRef>
+          <a:fillRef idx="0">
+            <a:schemeClr val="accent1"/>
+          </a:fillRef>
+          <a:effectRef idx="0">
+            <a:schemeClr val="accent1"/>
+          </a:effectRef>
+          <a:fontRef idx="minor">
+            <a:schemeClr val="tx1"/>
+          </a:fontRef>
+        </p:style>
+      </p:cxnSp>
+      <p:cxnSp>
+        <p:nvCxnSpPr>
+          <p:cNvPr id="36" name="Straight Connector 35"/>
+          <p:cNvCxnSpPr>
+            <a:endCxn id="16" idx="0"/>
+          </p:cNvCxnSpPr>
+          <p:nvPr/>
+        </p:nvCxnSpPr>
+        <p:spPr>
+          <a:xfrm rot="10800000" flipV="1">
+            <a:off x="1524000" y="2057400"/>
+            <a:ext cx="1066800" cy="609600"/>
+          </a:xfrm>
+          <a:prstGeom prst="line">
+            <a:avLst/>
+          </a:prstGeom>
+          <a:ln>
+            <a:solidFill>
+              <a:schemeClr val="bg1">
+                <a:lumMod val="75000"/>
+                <a:lumOff val="25000"/>
+              </a:schemeClr>
+            </a:solidFill>
+          </a:ln>
+          <a:effectLst>
+            <a:glow rad="139700">
+              <a:schemeClr val="accent5">
+                <a:satMod val="175000"/>
+                <a:alpha val="40000"/>
+              </a:schemeClr>
+            </a:glow>
+          </a:effectLst>
+        </p:spPr>
+        <p:style>
+          <a:lnRef idx="1">
+            <a:schemeClr val="accent1"/>
+          </a:lnRef>
+          <a:fillRef idx="0">
+            <a:schemeClr val="accent1"/>
+          </a:fillRef>
+          <a:effectRef idx="0">
+            <a:schemeClr val="accent1"/>
+          </a:effectRef>
+          <a:fontRef idx="minor">
+            <a:schemeClr val="tx1"/>
+          </a:fontRef>
+        </p:style>
+      </p:cxnSp>
+      <p:cxnSp>
+        <p:nvCxnSpPr>
+          <p:cNvPr id="40" name="Straight Connector 39"/>
+          <p:cNvCxnSpPr>
+            <a:stCxn id="19" idx="4"/>
+            <a:endCxn id="15" idx="0"/>
+          </p:cNvCxnSpPr>
+          <p:nvPr/>
+        </p:nvCxnSpPr>
+        <p:spPr>
+          <a:xfrm rot="16200000" flipH="1">
+            <a:off x="5238750" y="1504950"/>
+            <a:ext cx="609600" cy="1714500"/>
+          </a:xfrm>
+          <a:prstGeom prst="line">
+            <a:avLst/>
+          </a:prstGeom>
+          <a:ln>
+            <a:solidFill>
+              <a:schemeClr val="bg1">
+                <a:lumMod val="75000"/>
+                <a:lumOff val="25000"/>
+              </a:schemeClr>
+            </a:solidFill>
+          </a:ln>
+          <a:effectLst>
+            <a:glow rad="139700">
+              <a:schemeClr val="accent5">
+                <a:satMod val="175000"/>
+                <a:alpha val="40000"/>
+              </a:schemeClr>
+            </a:glow>
+          </a:effectLst>
+        </p:spPr>
+        <p:style>
+          <a:lnRef idx="1">
+            <a:schemeClr val="accent1"/>
+          </a:lnRef>
+          <a:fillRef idx="0">
+            <a:schemeClr val="accent1"/>
+          </a:fillRef>
+          <a:effectRef idx="0">
+            <a:schemeClr val="accent1"/>
+          </a:effectRef>
+          <a:fontRef idx="minor">
+            <a:schemeClr val="tx1"/>
+          </a:fontRef>
+        </p:style>
+      </p:cxnSp>
+      <p:cxnSp>
+        <p:nvCxnSpPr>
+          <p:cNvPr id="43" name="Straight Connector 42"/>
+          <p:cNvCxnSpPr>
+            <a:stCxn id="20" idx="4"/>
+            <a:endCxn id="15" idx="0"/>
+          </p:cNvCxnSpPr>
+          <p:nvPr/>
+        </p:nvCxnSpPr>
+        <p:spPr>
+          <a:xfrm rot="16200000" flipH="1">
+            <a:off x="6038850" y="2305050"/>
+            <a:ext cx="609600" cy="114300"/>
+          </a:xfrm>
+          <a:prstGeom prst="line">
+            <a:avLst/>
+          </a:prstGeom>
+          <a:ln>
+            <a:solidFill>
+              <a:schemeClr val="bg1">
+                <a:lumMod val="75000"/>
+                <a:lumOff val="25000"/>
+              </a:schemeClr>
+            </a:solidFill>
+          </a:ln>
+          <a:effectLst>
+            <a:glow rad="139700">
+              <a:schemeClr val="accent5">
+                <a:satMod val="175000"/>
+                <a:alpha val="40000"/>
+              </a:schemeClr>
+            </a:glow>
+          </a:effectLst>
+        </p:spPr>
+        <p:style>
+          <a:lnRef idx="1">
+            <a:schemeClr val="accent1"/>
+          </a:lnRef>
+          <a:fillRef idx="0">
+            <a:schemeClr val="accent1"/>
+          </a:fillRef>
+          <a:effectRef idx="0">
+            <a:schemeClr val="accent1"/>
+          </a:effectRef>
+          <a:fontRef idx="minor">
+            <a:schemeClr val="tx1"/>
+          </a:fontRef>
+        </p:style>
+      </p:cxnSp>
+      <p:cxnSp>
+        <p:nvCxnSpPr>
+          <p:cNvPr id="46" name="Straight Connector 45"/>
+          <p:cNvCxnSpPr>
+            <a:stCxn id="21" idx="4"/>
+            <a:endCxn id="15" idx="0"/>
+          </p:cNvCxnSpPr>
+          <p:nvPr/>
+        </p:nvCxnSpPr>
+        <p:spPr>
+          <a:xfrm rot="5400000">
+            <a:off x="6400800" y="1600200"/>
+            <a:ext cx="1066800" cy="1066800"/>
+          </a:xfrm>
+          <a:prstGeom prst="line">
+            <a:avLst/>
+          </a:prstGeom>
+          <a:ln>
+            <a:solidFill>
+              <a:schemeClr val="bg1">
+                <a:lumMod val="75000"/>
+                <a:lumOff val="25000"/>
+              </a:schemeClr>
+            </a:solidFill>
+          </a:ln>
+          <a:effectLst>
+            <a:glow rad="139700">
+              <a:schemeClr val="accent5">
+                <a:satMod val="175000"/>
+                <a:alpha val="40000"/>
+              </a:schemeClr>
+            </a:glow>
+          </a:effectLst>
+        </p:spPr>
+        <p:style>
+          <a:lnRef idx="1">
+            <a:schemeClr val="accent1"/>
+          </a:lnRef>
+          <a:fillRef idx="0">
+            <a:schemeClr val="accent1"/>
+          </a:fillRef>
+          <a:effectRef idx="0">
+            <a:schemeClr val="accent1"/>
+          </a:effectRef>
+          <a:fontRef idx="minor">
+            <a:schemeClr val="tx1"/>
+          </a:fontRef>
+        </p:style>
+      </p:cxnSp>
+      <p:cxnSp>
+        <p:nvCxnSpPr>
+          <p:cNvPr id="49" name="Straight Connector 48"/>
+          <p:cNvCxnSpPr>
+            <a:stCxn id="22" idx="4"/>
+            <a:endCxn id="15" idx="0"/>
+          </p:cNvCxnSpPr>
+          <p:nvPr/>
+        </p:nvCxnSpPr>
+        <p:spPr>
+          <a:xfrm rot="5400000">
+            <a:off x="6991350" y="1619250"/>
+            <a:ext cx="457200" cy="1638300"/>
+          </a:xfrm>
+          <a:prstGeom prst="line">
+            <a:avLst/>
+          </a:prstGeom>
+          <a:ln>
+            <a:solidFill>
+              <a:schemeClr val="bg1">
+                <a:lumMod val="75000"/>
+                <a:lumOff val="25000"/>
+              </a:schemeClr>
+            </a:solidFill>
+          </a:ln>
+          <a:effectLst>
+            <a:glow rad="139700">
+              <a:schemeClr val="accent5">
+                <a:satMod val="175000"/>
+                <a:alpha val="40000"/>
+              </a:schemeClr>
+            </a:glow>
+          </a:effectLst>
+        </p:spPr>
+        <p:style>
+          <a:lnRef idx="1">
+            <a:schemeClr val="accent1"/>
+          </a:lnRef>
+          <a:fillRef idx="0">
+            <a:schemeClr val="accent1"/>
+          </a:fillRef>
+          <a:effectRef idx="0">
+            <a:schemeClr val="accent1"/>
+          </a:effectRef>
+          <a:fontRef idx="minor">
+            <a:schemeClr val="tx1"/>
+          </a:fontRef>
+        </p:style>
+      </p:cxnSp>
+      <p:cxnSp>
+        <p:nvCxnSpPr>
+          <p:cNvPr id="52" name="Straight Connector 51"/>
+          <p:cNvCxnSpPr>
+            <a:stCxn id="23" idx="1"/>
+            <a:endCxn id="15" idx="0"/>
+          </p:cNvCxnSpPr>
+          <p:nvPr/>
+        </p:nvCxnSpPr>
+        <p:spPr>
+          <a:xfrm rot="16200000" flipH="1" flipV="1">
+            <a:off x="7095052" y="1757222"/>
+            <a:ext cx="215526" cy="1604029"/>
+          </a:xfrm>
+          <a:prstGeom prst="line">
+            <a:avLst/>
+          </a:prstGeom>
+          <a:ln>
+            <a:solidFill>
+              <a:schemeClr val="bg1">
+                <a:lumMod val="75000"/>
+                <a:lumOff val="25000"/>
+              </a:schemeClr>
+            </a:solidFill>
+          </a:ln>
+          <a:effectLst>
+            <a:glow rad="139700">
+              <a:schemeClr val="accent5">
+                <a:satMod val="175000"/>
+                <a:alpha val="40000"/>
+              </a:schemeClr>
+            </a:glow>
+          </a:effectLst>
+        </p:spPr>
+        <p:style>
+          <a:lnRef idx="1">
+            <a:schemeClr val="accent1"/>
+          </a:lnRef>
+          <a:fillRef idx="0">
+            <a:schemeClr val="accent1"/>
+          </a:fillRef>
+          <a:effectRef idx="0">
+            <a:schemeClr val="accent1"/>
+          </a:effectRef>
+          <a:fontRef idx="minor">
+            <a:schemeClr val="tx1"/>
+          </a:fontRef>
+        </p:style>
+      </p:cxnSp>
+      <p:cxnSp>
+        <p:nvCxnSpPr>
+          <p:cNvPr id="57" name="Straight Connector 56"/>
+          <p:cNvCxnSpPr>
+            <a:stCxn id="29" idx="0"/>
+          </p:cNvCxnSpPr>
+          <p:nvPr/>
+        </p:nvCxnSpPr>
+        <p:spPr>
+          <a:xfrm rot="16200000" flipV="1">
+            <a:off x="6667500" y="5410200"/>
+            <a:ext cx="381000" cy="838200"/>
+          </a:xfrm>
+          <a:prstGeom prst="line">
+            <a:avLst/>
+          </a:prstGeom>
+          <a:ln>
+            <a:solidFill>
+              <a:schemeClr val="bg1">
+                <a:lumMod val="75000"/>
+                <a:lumOff val="25000"/>
+              </a:schemeClr>
+            </a:solidFill>
+          </a:ln>
+          <a:effectLst>
+            <a:glow rad="139700">
+              <a:schemeClr val="accent5">
+                <a:satMod val="175000"/>
+                <a:alpha val="40000"/>
+              </a:schemeClr>
+            </a:glow>
+          </a:effectLst>
+        </p:spPr>
+        <p:style>
+          <a:lnRef idx="1">
+            <a:schemeClr val="accent1"/>
+          </a:lnRef>
+          <a:fillRef idx="0">
+            <a:schemeClr val="accent1"/>
+          </a:fillRef>
+          <a:effectRef idx="0">
+            <a:schemeClr val="accent1"/>
+          </a:effectRef>
+          <a:fontRef idx="minor">
+            <a:schemeClr val="tx1"/>
+          </a:fontRef>
+        </p:style>
+      </p:cxnSp>
+      <p:cxnSp>
+        <p:nvCxnSpPr>
+          <p:cNvPr id="59" name="Straight Connector 58"/>
+          <p:cNvCxnSpPr/>
+          <p:nvPr/>
+        </p:nvCxnSpPr>
+        <p:spPr>
+          <a:xfrm flipV="1">
+            <a:off x="3962400" y="5638800"/>
+            <a:ext cx="2400300" cy="304800"/>
+          </a:xfrm>
+          <a:prstGeom prst="line">
+            <a:avLst/>
+          </a:prstGeom>
+          <a:ln>
+            <a:solidFill>
+              <a:schemeClr val="bg1">
+                <a:lumMod val="75000"/>
+                <a:lumOff val="25000"/>
+              </a:schemeClr>
+            </a:solidFill>
+          </a:ln>
+          <a:effectLst>
+            <a:glow rad="139700">
+              <a:schemeClr val="accent5">
+                <a:satMod val="175000"/>
+                <a:alpha val="40000"/>
+              </a:schemeClr>
+            </a:glow>
+          </a:effectLst>
+        </p:spPr>
+        <p:style>
+          <a:lnRef idx="1">
+            <a:schemeClr val="accent1"/>
+          </a:lnRef>
+          <a:fillRef idx="0">
+            <a:schemeClr val="accent1"/>
+          </a:fillRef>
+          <a:effectRef idx="0">
+            <a:schemeClr val="accent1"/>
+          </a:effectRef>
+          <a:fontRef idx="minor">
+            <a:schemeClr val="tx1"/>
+          </a:fontRef>
+        </p:style>
+      </p:cxnSp>
+      <p:cxnSp>
+        <p:nvCxnSpPr>
+          <p:cNvPr id="61" name="Straight Connector 60"/>
+          <p:cNvCxnSpPr>
+            <a:stCxn id="28" idx="0"/>
+          </p:cNvCxnSpPr>
+          <p:nvPr/>
+        </p:nvCxnSpPr>
+        <p:spPr>
+          <a:xfrm rot="5400000" flipH="1" flipV="1">
+            <a:off x="5924550" y="5772150"/>
+            <a:ext cx="609600" cy="342900"/>
+          </a:xfrm>
+          <a:prstGeom prst="line">
+            <a:avLst/>
+          </a:prstGeom>
+          <a:ln>
+            <a:solidFill>
+              <a:schemeClr val="bg1">
+                <a:lumMod val="75000"/>
+                <a:lumOff val="25000"/>
+              </a:schemeClr>
+            </a:solidFill>
+          </a:ln>
+          <a:effectLst>
+            <a:glow rad="139700">
+              <a:schemeClr val="accent5">
+                <a:satMod val="175000"/>
+                <a:alpha val="40000"/>
+              </a:schemeClr>
+            </a:glow>
+          </a:effectLst>
+        </p:spPr>
+        <p:style>
+          <a:lnRef idx="1">
+            <a:schemeClr val="accent1"/>
+          </a:lnRef>
+          <a:fillRef idx="0">
+            <a:schemeClr val="accent1"/>
+          </a:fillRef>
+          <a:effectRef idx="0">
+            <a:schemeClr val="accent1"/>
+          </a:effectRef>
+          <a:fontRef idx="minor">
+            <a:schemeClr val="tx1"/>
+          </a:fontRef>
+        </p:style>
+      </p:cxnSp>
+      <p:cxnSp>
+        <p:nvCxnSpPr>
+          <p:cNvPr id="65" name="Straight Connector 64"/>
+          <p:cNvCxnSpPr>
+            <a:stCxn id="27" idx="0"/>
+          </p:cNvCxnSpPr>
+          <p:nvPr/>
+        </p:nvCxnSpPr>
+        <p:spPr>
+          <a:xfrm rot="5400000" flipH="1" flipV="1">
+            <a:off x="5429250" y="5276850"/>
+            <a:ext cx="609600" cy="1333500"/>
+          </a:xfrm>
+          <a:prstGeom prst="line">
+            <a:avLst/>
+          </a:prstGeom>
+          <a:ln>
+            <a:solidFill>
+              <a:schemeClr val="bg1">
+                <a:lumMod val="75000"/>
+                <a:lumOff val="25000"/>
+              </a:schemeClr>
+            </a:solidFill>
+          </a:ln>
+          <a:effectLst>
+            <a:glow rad="139700">
+              <a:schemeClr val="accent5">
+                <a:satMod val="175000"/>
+                <a:alpha val="40000"/>
+              </a:schemeClr>
+            </a:glow>
+          </a:effectLst>
+        </p:spPr>
+        <p:style>
+          <a:lnRef idx="1">
+            <a:schemeClr val="accent1"/>
+          </a:lnRef>
+          <a:fillRef idx="0">
+            <a:schemeClr val="accent1"/>
+          </a:fillRef>
+          <a:effectRef idx="0">
+            <a:schemeClr val="accent1"/>
+          </a:effectRef>
+          <a:fontRef idx="minor">
+            <a:schemeClr val="tx1"/>
+          </a:fontRef>
+        </p:style>
+      </p:cxnSp>
+      <p:cxnSp>
+        <p:nvCxnSpPr>
+          <p:cNvPr id="69" name="Straight Connector 68"/>
+          <p:cNvCxnSpPr/>
+          <p:nvPr/>
+        </p:nvCxnSpPr>
+        <p:spPr>
+          <a:xfrm rot="10800000">
+            <a:off x="6477000" y="5638800"/>
+            <a:ext cx="1447800" cy="152400"/>
+          </a:xfrm>
+          <a:prstGeom prst="line">
+            <a:avLst/>
+          </a:prstGeom>
+          <a:ln>
+            <a:solidFill>
+              <a:schemeClr val="bg1">
+                <a:lumMod val="75000"/>
+                <a:lumOff val="25000"/>
+              </a:schemeClr>
+            </a:solidFill>
+          </a:ln>
+          <a:effectLst>
+            <a:glow rad="139700">
+              <a:schemeClr val="accent5">
+                <a:satMod val="175000"/>
+                <a:alpha val="40000"/>
+              </a:schemeClr>
+            </a:glow>
+          </a:effectLst>
+        </p:spPr>
+        <p:style>
+          <a:lnRef idx="1">
+            <a:schemeClr val="accent1"/>
+          </a:lnRef>
+          <a:fillRef idx="0">
+            <a:schemeClr val="accent1"/>
+          </a:fillRef>
+          <a:effectRef idx="0">
+            <a:schemeClr val="accent1"/>
+          </a:effectRef>
+          <a:fontRef idx="minor">
+            <a:schemeClr val="tx1"/>
+          </a:fontRef>
+        </p:style>
+      </p:cxnSp>
+      <p:cxnSp>
+        <p:nvCxnSpPr>
+          <p:cNvPr id="71" name="Straight Connector 70"/>
+          <p:cNvCxnSpPr>
+            <a:stCxn id="25" idx="1"/>
+            <a:endCxn id="16" idx="3"/>
+          </p:cNvCxnSpPr>
+          <p:nvPr/>
+        </p:nvCxnSpPr>
+        <p:spPr>
+          <a:xfrm rot="10800000">
+            <a:off x="2590800" y="2933700"/>
+            <a:ext cx="914400" cy="38100"/>
+          </a:xfrm>
+          <a:prstGeom prst="line">
+            <a:avLst/>
+          </a:prstGeom>
+          <a:ln>
+            <a:solidFill>
+              <a:schemeClr val="bg1">
+                <a:lumMod val="75000"/>
+                <a:lumOff val="25000"/>
+              </a:schemeClr>
+            </a:solidFill>
+          </a:ln>
+          <a:effectLst>
+            <a:glow rad="139700">
+              <a:schemeClr val="accent5">
+                <a:satMod val="175000"/>
+                <a:alpha val="40000"/>
+              </a:schemeClr>
+            </a:glow>
+          </a:effectLst>
+        </p:spPr>
+        <p:style>
+          <a:lnRef idx="1">
+            <a:schemeClr val="accent1"/>
+          </a:lnRef>
+          <a:fillRef idx="0">
+            <a:schemeClr val="accent1"/>
+          </a:fillRef>
+          <a:effectRef idx="0">
+            <a:schemeClr val="accent1"/>
+          </a:effectRef>
+          <a:fontRef idx="minor">
+            <a:schemeClr val="tx1"/>
+          </a:fontRef>
+        </p:style>
+      </p:cxnSp>
+      <p:cxnSp>
+        <p:nvCxnSpPr>
+          <p:cNvPr id="88" name="Straight Connector 87"/>
+          <p:cNvCxnSpPr>
+            <a:endCxn id="25" idx="3"/>
+          </p:cNvCxnSpPr>
+          <p:nvPr/>
+        </p:nvCxnSpPr>
+        <p:spPr>
+          <a:xfrm rot="10800000" flipV="1">
+            <a:off x="4800600" y="2933700"/>
+            <a:ext cx="533400" cy="38100"/>
+          </a:xfrm>
+          <a:prstGeom prst="line">
+            <a:avLst/>
+          </a:prstGeom>
+          <a:ln>
+            <a:solidFill>
+              <a:schemeClr val="bg1">
+                <a:lumMod val="75000"/>
+                <a:lumOff val="25000"/>
+              </a:schemeClr>
+            </a:solidFill>
+          </a:ln>
+          <a:effectLst>
+            <a:glow rad="139700">
+              <a:schemeClr val="accent5">
+                <a:satMod val="175000"/>
+                <a:alpha val="40000"/>
+              </a:schemeClr>
+            </a:glow>
+          </a:effectLst>
+        </p:spPr>
+        <p:style>
+          <a:lnRef idx="1">
+            <a:schemeClr val="accent1"/>
+          </a:lnRef>
+          <a:fillRef idx="0">
+            <a:schemeClr val="accent1"/>
+          </a:fillRef>
+          <a:effectRef idx="0">
+            <a:schemeClr val="accent1"/>
+          </a:effectRef>
+          <a:fontRef idx="minor">
+            <a:schemeClr val="tx1"/>
+          </a:fontRef>
+        </p:style>
+      </p:cxnSp>
+      <p:cxnSp>
+        <p:nvCxnSpPr>
+          <p:cNvPr id="100" name="Straight Connector 99"/>
+          <p:cNvCxnSpPr>
+            <a:endCxn id="26" idx="0"/>
+          </p:cNvCxnSpPr>
+          <p:nvPr/>
+        </p:nvCxnSpPr>
+        <p:spPr>
+          <a:xfrm rot="5400000">
+            <a:off x="6229350" y="3486150"/>
+            <a:ext cx="495300" cy="1588"/>
+          </a:xfrm>
+          <a:prstGeom prst="line">
+            <a:avLst/>
+          </a:prstGeom>
+          <a:ln>
+            <a:solidFill>
+              <a:schemeClr val="bg1">
+                <a:lumMod val="75000"/>
+                <a:lumOff val="25000"/>
+              </a:schemeClr>
+            </a:solidFill>
+          </a:ln>
+          <a:effectLst>
+            <a:glow rad="139700">
+              <a:schemeClr val="accent5">
+                <a:satMod val="175000"/>
+                <a:alpha val="40000"/>
+              </a:schemeClr>
+            </a:glow>
+          </a:effectLst>
+        </p:spPr>
+        <p:style>
+          <a:lnRef idx="1">
+            <a:schemeClr val="accent1"/>
+          </a:lnRef>
+          <a:fillRef idx="0">
+            <a:schemeClr val="accent1"/>
+          </a:fillRef>
+          <a:effectRef idx="0">
+            <a:schemeClr val="accent1"/>
+          </a:effectRef>
+          <a:fontRef idx="minor">
+            <a:schemeClr val="tx1"/>
+          </a:fontRef>
+        </p:style>
+      </p:cxnSp>
+      <p:cxnSp>
+        <p:nvCxnSpPr>
+          <p:cNvPr id="103" name="Straight Connector 102"/>
+          <p:cNvCxnSpPr>
+            <a:endCxn id="14" idx="0"/>
+          </p:cNvCxnSpPr>
+          <p:nvPr/>
+        </p:nvCxnSpPr>
+        <p:spPr>
+          <a:xfrm rot="16200000" flipH="1">
+            <a:off x="6268244" y="4858544"/>
+            <a:ext cx="457200" cy="36512"/>
+          </a:xfrm>
+          <a:prstGeom prst="line">
+            <a:avLst/>
+          </a:prstGeom>
+          <a:ln>
+            <a:solidFill>
+              <a:schemeClr val="bg1">
+                <a:lumMod val="75000"/>
+                <a:lumOff val="25000"/>
+              </a:schemeClr>
+            </a:solidFill>
+          </a:ln>
+          <a:effectLst>
+            <a:glow rad="139700">
+              <a:schemeClr val="accent5">
+                <a:satMod val="175000"/>
+                <a:alpha val="40000"/>
+              </a:schemeClr>
+            </a:glow>
+          </a:effectLst>
+        </p:spPr>
+        <p:style>
+          <a:lnRef idx="1">
+            <a:schemeClr val="accent1"/>
+          </a:lnRef>
+          <a:fillRef idx="0">
+            <a:schemeClr val="accent1"/>
+          </a:fillRef>
+          <a:effectRef idx="0">
+            <a:schemeClr val="accent1"/>
+          </a:effectRef>
+          <a:fontRef idx="minor">
+            <a:schemeClr val="tx1"/>
+          </a:fontRef>
+        </p:style>
+      </p:cxnSp>
+    </p:spTree>
+  </p:cSld>
+  <p:clrMapOvr>
+    <a:masterClrMapping/>
+  </p:clrMapOvr>
+  <p:timing>
+    <p:tnLst>
+      <p:par>
+        <p:cTn id="1" dur="indefinite" restart="never" nodeType="tmRoot"/>
+      </p:par>
+    </p:tnLst>
+  </p:timing>
+</p:sld>
+</file>
+
+<file path=ppt/slides/slide7.xml><?xml version="1.0" encoding="utf-8"?>
+<p:sld xmlns:a="http://schemas.openxmlformats.org/drawingml/2006/main" xmlns:r="http://schemas.openxmlformats.org/officeDocument/2006/relationships" xmlns:p="http://schemas.openxmlformats.org/presentationml/2006/main">
+  <p:cSld>
+    <p:spTree>
+      <p:nvGrpSpPr>
+        <p:cNvPr id="1" name=""/>
+        <p:cNvGrpSpPr/>
+        <p:nvPr/>
+      </p:nvGrpSpPr>
+      <p:grpSpPr>
+        <a:xfrm>
+          <a:off x="0" y="0"/>
+          <a:ext cx="0" cy="0"/>
+          <a:chOff x="0" y="0"/>
+          <a:chExt cx="0" cy="0"/>
+        </a:xfrm>
+      </p:grpSpPr>
+      <p:sp>
+        <p:nvSpPr>
+          <p:cNvPr id="2" name="Title 1"/>
+          <p:cNvSpPr>
+            <a:spLocks noGrp="1"/>
+          </p:cNvSpPr>
+          <p:nvPr>
+            <p:ph type="title"/>
+          </p:nvPr>
+        </p:nvSpPr>
+        <p:spPr>
+          <a:xfrm>
+            <a:off x="457200" y="274638"/>
             <a:ext cx="8229600" cy="1020762"/>
           </a:xfrm>
         </p:spPr>

</xml_diff>